<commit_message>
Added some notes to powerpoint
</commit_message>
<xml_diff>
--- a/3610 Presentation.pptx
+++ b/3610 Presentation.pptx
@@ -204,7 +204,7 @@
           <a:p>
             <a:fld id="{45F41EA3-EFF2-474B-A924-F6FCCE16B7CE}" type="datetimeFigureOut">
               <a:rPr lang="en-US" smtClean="0"/>
-              <a:t>4/25/2015</a:t>
+              <a:t>4/26/2015</a:t>
             </a:fld>
             <a:endParaRPr lang="en-US"/>
           </a:p>
@@ -516,6 +516,114 @@
           <a:bodyPr/>
           <a:lstStyle/>
           <a:p>
+            <a:r>
+              <a:rPr lang="en-US" dirty="0" err="1" smtClean="0"/>
+              <a:t>AssetUser</a:t>
+            </a:r>
+            <a:r>
+              <a:rPr lang="en-US" dirty="0" smtClean="0"/>
+              <a:t> is a join table between </a:t>
+            </a:r>
+            <a:r>
+              <a:rPr lang="en-US" dirty="0" err="1" smtClean="0"/>
+              <a:t>AspNetUser</a:t>
+            </a:r>
+            <a:r>
+              <a:rPr lang="en-US" baseline="0" dirty="0" smtClean="0"/>
+              <a:t> and Asset so we don’t alter anything in </a:t>
+            </a:r>
+            <a:r>
+              <a:rPr lang="en-US" baseline="0" dirty="0" err="1" smtClean="0"/>
+              <a:t>AspNetUser</a:t>
+            </a:r>
+            <a:r>
+              <a:rPr lang="en-US" baseline="0" dirty="0" smtClean="0"/>
+              <a:t>. Users have Assets and Assets have Models and Models have Type</a:t>
+            </a:r>
+            <a:endParaRPr lang="en-US" dirty="0"/>
+          </a:p>
+        </p:txBody>
+      </p:sp>
+      <p:sp>
+        <p:nvSpPr>
+          <p:cNvPr id="4" name="Slide Number Placeholder 3"/>
+          <p:cNvSpPr>
+            <a:spLocks noGrp="1"/>
+          </p:cNvSpPr>
+          <p:nvPr>
+            <p:ph type="sldNum" sz="quarter" idx="10"/>
+          </p:nvPr>
+        </p:nvSpPr>
+        <p:spPr/>
+        <p:txBody>
+          <a:bodyPr/>
+          <a:lstStyle/>
+          <a:p>
+            <a:fld id="{20A4151E-10FD-415C-8555-A491F065CF6B}" type="slidenum">
+              <a:rPr lang="en-US" smtClean="0"/>
+              <a:t>2</a:t>
+            </a:fld>
+            <a:endParaRPr lang="en-US"/>
+          </a:p>
+        </p:txBody>
+      </p:sp>
+    </p:spTree>
+    <p:extLst>
+      <p:ext uri="{BB962C8B-B14F-4D97-AF65-F5344CB8AC3E}">
+        <p14:creationId xmlns:p14="http://schemas.microsoft.com/office/powerpoint/2010/main" val="2103264353"/>
+      </p:ext>
+    </p:extLst>
+  </p:cSld>
+  <p:clrMapOvr>
+    <a:masterClrMapping/>
+  </p:clrMapOvr>
+</p:notes>
+</file>
+
+<file path=ppt/notesSlides/notesSlide2.xml><?xml version="1.0" encoding="utf-8"?>
+<p:notes xmlns:a="http://schemas.openxmlformats.org/drawingml/2006/main" xmlns:r="http://schemas.openxmlformats.org/officeDocument/2006/relationships" xmlns:p="http://schemas.openxmlformats.org/presentationml/2006/main">
+  <p:cSld>
+    <p:spTree>
+      <p:nvGrpSpPr>
+        <p:cNvPr id="1" name=""/>
+        <p:cNvGrpSpPr/>
+        <p:nvPr/>
+      </p:nvGrpSpPr>
+      <p:grpSpPr>
+        <a:xfrm>
+          <a:off x="0" y="0"/>
+          <a:ext cx="0" cy="0"/>
+          <a:chOff x="0" y="0"/>
+          <a:chExt cx="0" cy="0"/>
+        </a:xfrm>
+      </p:grpSpPr>
+      <p:sp>
+        <p:nvSpPr>
+          <p:cNvPr id="2" name="Slide Image Placeholder 1"/>
+          <p:cNvSpPr>
+            <a:spLocks noGrp="1" noRot="1" noChangeAspect="1"/>
+          </p:cNvSpPr>
+          <p:nvPr>
+            <p:ph type="sldImg"/>
+          </p:nvPr>
+        </p:nvSpPr>
+        <p:spPr/>
+      </p:sp>
+      <p:sp>
+        <p:nvSpPr>
+          <p:cNvPr id="3" name="Notes Placeholder 2"/>
+          <p:cNvSpPr>
+            <a:spLocks noGrp="1"/>
+          </p:cNvSpPr>
+          <p:nvPr>
+            <p:ph type="body" idx="1"/>
+          </p:nvPr>
+        </p:nvSpPr>
+        <p:spPr/>
+        <p:txBody>
+          <a:bodyPr/>
+          <a:lstStyle/>
+          <a:p>
             <a:endParaRPr lang="en-US" dirty="0"/>
           </a:p>
         </p:txBody>
@@ -743,7 +851,7 @@
           <a:p>
             <a:fld id="{1EFB939A-613A-477C-936C-59751EDD593B}" type="datetimeFigureOut">
               <a:rPr lang="en-US" smtClean="0"/>
-              <a:t>4/25/2015</a:t>
+              <a:t>4/26/2015</a:t>
             </a:fld>
             <a:endParaRPr lang="en-US"/>
           </a:p>
@@ -908,7 +1016,7 @@
           <a:p>
             <a:fld id="{1EFB939A-613A-477C-936C-59751EDD593B}" type="datetimeFigureOut">
               <a:rPr lang="en-US" smtClean="0"/>
-              <a:t>4/25/2015</a:t>
+              <a:t>4/26/2015</a:t>
             </a:fld>
             <a:endParaRPr lang="en-US"/>
           </a:p>
@@ -1083,7 +1191,7 @@
           <a:p>
             <a:fld id="{1EFB939A-613A-477C-936C-59751EDD593B}" type="datetimeFigureOut">
               <a:rPr lang="en-US" smtClean="0"/>
-              <a:t>4/25/2015</a:t>
+              <a:t>4/26/2015</a:t>
             </a:fld>
             <a:endParaRPr lang="en-US"/>
           </a:p>
@@ -1320,7 +1428,7 @@
           <a:p>
             <a:fld id="{1EFB939A-613A-477C-936C-59751EDD593B}" type="datetimeFigureOut">
               <a:rPr lang="en-US" smtClean="0"/>
-              <a:t>4/25/2015</a:t>
+              <a:t>4/26/2015</a:t>
             </a:fld>
             <a:endParaRPr lang="en-US"/>
           </a:p>
@@ -1490,7 +1598,7 @@
           <a:p>
             <a:fld id="{1EFB939A-613A-477C-936C-59751EDD593B}" type="datetimeFigureOut">
               <a:rPr lang="en-US" smtClean="0"/>
-              <a:t>4/25/2015</a:t>
+              <a:t>4/26/2015</a:t>
             </a:fld>
             <a:endParaRPr lang="en-US"/>
           </a:p>
@@ -1736,7 +1844,7 @@
           <a:p>
             <a:fld id="{1EFB939A-613A-477C-936C-59751EDD593B}" type="datetimeFigureOut">
               <a:rPr lang="en-US" smtClean="0"/>
-              <a:t>4/25/2015</a:t>
+              <a:t>4/26/2015</a:t>
             </a:fld>
             <a:endParaRPr lang="en-US"/>
           </a:p>
@@ -2024,7 +2132,7 @@
           <a:p>
             <a:fld id="{1EFB939A-613A-477C-936C-59751EDD593B}" type="datetimeFigureOut">
               <a:rPr lang="en-US" smtClean="0"/>
-              <a:t>4/25/2015</a:t>
+              <a:t>4/26/2015</a:t>
             </a:fld>
             <a:endParaRPr lang="en-US"/>
           </a:p>
@@ -2446,7 +2554,7 @@
           <a:p>
             <a:fld id="{1EFB939A-613A-477C-936C-59751EDD593B}" type="datetimeFigureOut">
               <a:rPr lang="en-US" smtClean="0"/>
-              <a:t>4/25/2015</a:t>
+              <a:t>4/26/2015</a:t>
             </a:fld>
             <a:endParaRPr lang="en-US"/>
           </a:p>
@@ -2564,7 +2672,7 @@
           <a:p>
             <a:fld id="{1EFB939A-613A-477C-936C-59751EDD593B}" type="datetimeFigureOut">
               <a:rPr lang="en-US" smtClean="0"/>
-              <a:t>4/25/2015</a:t>
+              <a:t>4/26/2015</a:t>
             </a:fld>
             <a:endParaRPr lang="en-US"/>
           </a:p>
@@ -2659,7 +2767,7 @@
           <a:p>
             <a:fld id="{1EFB939A-613A-477C-936C-59751EDD593B}" type="datetimeFigureOut">
               <a:rPr lang="en-US" smtClean="0"/>
-              <a:t>4/25/2015</a:t>
+              <a:t>4/26/2015</a:t>
             </a:fld>
             <a:endParaRPr lang="en-US"/>
           </a:p>
@@ -2936,7 +3044,7 @@
           <a:p>
             <a:fld id="{1EFB939A-613A-477C-936C-59751EDD593B}" type="datetimeFigureOut">
               <a:rPr lang="en-US" smtClean="0"/>
-              <a:t>4/25/2015</a:t>
+              <a:t>4/26/2015</a:t>
             </a:fld>
             <a:endParaRPr lang="en-US"/>
           </a:p>
@@ -3106,7 +3214,7 @@
           <a:p>
             <a:fld id="{1EFB939A-613A-477C-936C-59751EDD593B}" type="datetimeFigureOut">
               <a:rPr lang="en-US" smtClean="0"/>
-              <a:t>4/25/2015</a:t>
+              <a:t>4/26/2015</a:t>
             </a:fld>
             <a:endParaRPr lang="en-US"/>
           </a:p>
@@ -3354,7 +3462,7 @@
           <a:p>
             <a:fld id="{1EFB939A-613A-477C-936C-59751EDD593B}" type="datetimeFigureOut">
               <a:rPr lang="en-US" smtClean="0"/>
-              <a:t>4/25/2015</a:t>
+              <a:t>4/26/2015</a:t>
             </a:fld>
             <a:endParaRPr lang="en-US"/>
           </a:p>
@@ -3524,7 +3632,7 @@
           <a:p>
             <a:fld id="{1EFB939A-613A-477C-936C-59751EDD593B}" type="datetimeFigureOut">
               <a:rPr lang="en-US" smtClean="0"/>
-              <a:t>4/25/2015</a:t>
+              <a:t>4/26/2015</a:t>
             </a:fld>
             <a:endParaRPr lang="en-US"/>
           </a:p>
@@ -3704,7 +3812,7 @@
           <a:p>
             <a:fld id="{1EFB939A-613A-477C-936C-59751EDD593B}" type="datetimeFigureOut">
               <a:rPr lang="en-US" smtClean="0"/>
-              <a:t>4/25/2015</a:t>
+              <a:t>4/26/2015</a:t>
             </a:fld>
             <a:endParaRPr lang="en-US"/>
           </a:p>
@@ -3948,7 +4056,7 @@
           <a:p>
             <a:fld id="{1EFB939A-613A-477C-936C-59751EDD593B}" type="datetimeFigureOut">
               <a:rPr lang="en-US" smtClean="0"/>
-              <a:t>4/25/2015</a:t>
+              <a:t>4/26/2015</a:t>
             </a:fld>
             <a:endParaRPr lang="en-US"/>
           </a:p>
@@ -4038,7 +4146,7 @@
           <a:p>
             <a:fld id="{1EFB939A-613A-477C-936C-59751EDD593B}" type="datetimeFigureOut">
               <a:rPr lang="en-US" smtClean="0"/>
-              <a:t>4/25/2015</a:t>
+              <a:t>4/26/2015</a:t>
             </a:fld>
             <a:endParaRPr lang="en-US"/>
           </a:p>
@@ -4412,7 +4520,7 @@
           <a:p>
             <a:fld id="{1EFB939A-613A-477C-936C-59751EDD593B}" type="datetimeFigureOut">
               <a:rPr lang="en-US" smtClean="0"/>
-              <a:t>4/25/2015</a:t>
+              <a:t>4/26/2015</a:t>
             </a:fld>
             <a:endParaRPr lang="en-US"/>
           </a:p>
@@ -4667,7 +4775,7 @@
           <a:p>
             <a:fld id="{1EFB939A-613A-477C-936C-59751EDD593B}" type="datetimeFigureOut">
               <a:rPr lang="en-US" smtClean="0"/>
-              <a:t>4/25/2015</a:t>
+              <a:t>4/26/2015</a:t>
             </a:fld>
             <a:endParaRPr lang="en-US"/>
           </a:p>
@@ -4757,7 +4865,7 @@
           <a:p>
             <a:fld id="{1EFB939A-613A-477C-936C-59751EDD593B}" type="datetimeFigureOut">
               <a:rPr lang="en-US" smtClean="0"/>
-              <a:t>4/25/2015</a:t>
+              <a:t>4/26/2015</a:t>
             </a:fld>
             <a:endParaRPr lang="en-US"/>
           </a:p>
@@ -5031,7 +5139,7 @@
           <a:p>
             <a:fld id="{1EFB939A-613A-477C-936C-59751EDD593B}" type="datetimeFigureOut">
               <a:rPr lang="en-US" smtClean="0"/>
-              <a:t>4/25/2015</a:t>
+              <a:t>4/26/2015</a:t>
             </a:fld>
             <a:endParaRPr lang="en-US"/>
           </a:p>
@@ -5303,7 +5411,7 @@
           <a:p>
             <a:fld id="{1EFB939A-613A-477C-936C-59751EDD593B}" type="datetimeFigureOut">
               <a:rPr lang="en-US" smtClean="0"/>
-              <a:t>4/25/2015</a:t>
+              <a:t>4/26/2015</a:t>
             </a:fld>
             <a:endParaRPr lang="en-US"/>
           </a:p>
@@ -5603,7 +5711,7 @@
           <a:p>
             <a:fld id="{1EFB939A-613A-477C-936C-59751EDD593B}" type="datetimeFigureOut">
               <a:rPr lang="en-US" smtClean="0"/>
-              <a:t>4/25/2015</a:t>
+              <a:t>4/26/2015</a:t>
             </a:fld>
             <a:endParaRPr lang="en-US"/>
           </a:p>
@@ -6187,7 +6295,7 @@
           <a:p>
             <a:fld id="{1EFB939A-613A-477C-936C-59751EDD593B}" type="datetimeFigureOut">
               <a:rPr lang="en-US" smtClean="0"/>
-              <a:t>4/25/2015</a:t>
+              <a:t>4/26/2015</a:t>
             </a:fld>
             <a:endParaRPr lang="en-US"/>
           </a:p>
@@ -7091,7 +7199,7 @@
           <p:nvPr/>
         </p:nvPicPr>
         <p:blipFill>
-          <a:blip r:embed="rId2">
+          <a:blip r:embed="rId3">
             <a:extLst>
               <a:ext uri="{28A0092B-C50C-407E-A947-70E740481C1C}">
                 <a14:useLocalDpi xmlns:a14="http://schemas.microsoft.com/office/drawing/2010/main" val="0"/>

</xml_diff>

<commit_message>
Few Changes to Powerpoint
Highlighted a few lines of code in the images for fear of completely
forgetting what is happening in the code
</commit_message>
<xml_diff>
--- a/3610 Presentation.pptx
+++ b/3610 Presentation.pptx
@@ -473,114 +473,6 @@
 </file>
 
 <file path=ppt/notesSlides/notesSlide1.xml><?xml version="1.0" encoding="utf-8"?>
-<p:notes xmlns:a="http://schemas.openxmlformats.org/drawingml/2006/main" xmlns:r="http://schemas.openxmlformats.org/officeDocument/2006/relationships" xmlns:p="http://schemas.openxmlformats.org/presentationml/2006/main">
-  <p:cSld>
-    <p:spTree>
-      <p:nvGrpSpPr>
-        <p:cNvPr id="1" name=""/>
-        <p:cNvGrpSpPr/>
-        <p:nvPr/>
-      </p:nvGrpSpPr>
-      <p:grpSpPr>
-        <a:xfrm>
-          <a:off x="0" y="0"/>
-          <a:ext cx="0" cy="0"/>
-          <a:chOff x="0" y="0"/>
-          <a:chExt cx="0" cy="0"/>
-        </a:xfrm>
-      </p:grpSpPr>
-      <p:sp>
-        <p:nvSpPr>
-          <p:cNvPr id="2" name="Slide Image Placeholder 1"/>
-          <p:cNvSpPr>
-            <a:spLocks noGrp="1" noRot="1" noChangeAspect="1"/>
-          </p:cNvSpPr>
-          <p:nvPr>
-            <p:ph type="sldImg"/>
-          </p:nvPr>
-        </p:nvSpPr>
-        <p:spPr/>
-      </p:sp>
-      <p:sp>
-        <p:nvSpPr>
-          <p:cNvPr id="3" name="Notes Placeholder 2"/>
-          <p:cNvSpPr>
-            <a:spLocks noGrp="1"/>
-          </p:cNvSpPr>
-          <p:nvPr>
-            <p:ph type="body" idx="1"/>
-          </p:nvPr>
-        </p:nvSpPr>
-        <p:spPr/>
-        <p:txBody>
-          <a:bodyPr/>
-          <a:lstStyle/>
-          <a:p>
-            <a:r>
-              <a:rPr lang="en-US" dirty="0" err="1" smtClean="0"/>
-              <a:t>AssetUser</a:t>
-            </a:r>
-            <a:r>
-              <a:rPr lang="en-US" dirty="0" smtClean="0"/>
-              <a:t> is a join table between </a:t>
-            </a:r>
-            <a:r>
-              <a:rPr lang="en-US" dirty="0" err="1" smtClean="0"/>
-              <a:t>AspNetUser</a:t>
-            </a:r>
-            <a:r>
-              <a:rPr lang="en-US" baseline="0" dirty="0" smtClean="0"/>
-              <a:t> and Asset so we don’t alter anything in </a:t>
-            </a:r>
-            <a:r>
-              <a:rPr lang="en-US" baseline="0" dirty="0" err="1" smtClean="0"/>
-              <a:t>AspNetUser</a:t>
-            </a:r>
-            <a:r>
-              <a:rPr lang="en-US" baseline="0" dirty="0" smtClean="0"/>
-              <a:t>. Users have Assets and Assets have Models and Models have Type</a:t>
-            </a:r>
-            <a:endParaRPr lang="en-US" dirty="0"/>
-          </a:p>
-        </p:txBody>
-      </p:sp>
-      <p:sp>
-        <p:nvSpPr>
-          <p:cNvPr id="4" name="Slide Number Placeholder 3"/>
-          <p:cNvSpPr>
-            <a:spLocks noGrp="1"/>
-          </p:cNvSpPr>
-          <p:nvPr>
-            <p:ph type="sldNum" sz="quarter" idx="10"/>
-          </p:nvPr>
-        </p:nvSpPr>
-        <p:spPr/>
-        <p:txBody>
-          <a:bodyPr/>
-          <a:lstStyle/>
-          <a:p>
-            <a:fld id="{20A4151E-10FD-415C-8555-A491F065CF6B}" type="slidenum">
-              <a:rPr lang="en-US" smtClean="0"/>
-              <a:t>2</a:t>
-            </a:fld>
-            <a:endParaRPr lang="en-US"/>
-          </a:p>
-        </p:txBody>
-      </p:sp>
-    </p:spTree>
-    <p:extLst>
-      <p:ext uri="{BB962C8B-B14F-4D97-AF65-F5344CB8AC3E}">
-        <p14:creationId xmlns:p14="http://schemas.microsoft.com/office/powerpoint/2010/main" val="2103264353"/>
-      </p:ext>
-    </p:extLst>
-  </p:cSld>
-  <p:clrMapOvr>
-    <a:masterClrMapping/>
-  </p:clrMapOvr>
-</p:notes>
-</file>
-
-<file path=ppt/notesSlides/notesSlide2.xml><?xml version="1.0" encoding="utf-8"?>
 <p:notes xmlns:a="http://schemas.openxmlformats.org/drawingml/2006/main" xmlns:r="http://schemas.openxmlformats.org/officeDocument/2006/relationships" xmlns:p="http://schemas.openxmlformats.org/presentationml/2006/main">
   <p:cSld>
     <p:spTree>
@@ -6980,7 +6872,7 @@
         </p:blipFill>
         <p:spPr bwMode="auto">
           <a:xfrm>
-            <a:off x="1795463" y="2152650"/>
+            <a:off x="1795463" y="1676400"/>
             <a:ext cx="5553075" cy="2552700"/>
           </a:xfrm>
           <a:prstGeom prst="rect">
@@ -7140,6 +7032,13 @@
   <p:clrMapOvr>
     <a:masterClrMapping/>
   </p:clrMapOvr>
+  <p:timing>
+    <p:tnLst>
+      <p:par>
+        <p:cTn id="1" dur="indefinite" restart="never" nodeType="tmRoot"/>
+      </p:par>
+    </p:tnLst>
+  </p:timing>
 </p:sld>
 </file>
 
@@ -7199,7 +7098,7 @@
           <p:nvPr/>
         </p:nvPicPr>
         <p:blipFill>
-          <a:blip r:embed="rId3">
+          <a:blip r:embed="rId2">
             <a:extLst>
               <a:ext uri="{28A0092B-C50C-407E-A947-70E740481C1C}">
                 <a14:useLocalDpi xmlns:a14="http://schemas.microsoft.com/office/drawing/2010/main" val="0"/>
@@ -7341,9 +7240,37 @@
           <a:chExt cx="0" cy="0"/>
         </a:xfrm>
       </p:grpSpPr>
+      <p:sp>
+        <p:nvSpPr>
+          <p:cNvPr id="5" name="Title 1"/>
+          <p:cNvSpPr>
+            <a:spLocks noGrp="1"/>
+          </p:cNvSpPr>
+          <p:nvPr>
+            <p:ph type="title"/>
+          </p:nvPr>
+        </p:nvSpPr>
+        <p:spPr>
+          <a:xfrm>
+            <a:off x="533400" y="228600"/>
+            <a:ext cx="8229600" cy="1143000"/>
+          </a:xfrm>
+        </p:spPr>
+        <p:txBody>
+          <a:bodyPr/>
+          <a:lstStyle/>
+          <a:p>
+            <a:r>
+              <a:rPr lang="en-US" dirty="0" smtClean="0"/>
+              <a:t>Controller</a:t>
+            </a:r>
+            <a:endParaRPr lang="en-US" dirty="0"/>
+          </a:p>
+        </p:txBody>
+      </p:sp>
       <p:pic>
         <p:nvPicPr>
-          <p:cNvPr id="3074" name="Picture 2"/>
+          <p:cNvPr id="1027" name="Picture 3"/>
           <p:cNvPicPr>
             <a:picLocks noChangeAspect="1" noChangeArrowheads="1"/>
           </p:cNvPicPr>
@@ -7395,34 +7322,6 @@
           </a:extLst>
         </p:spPr>
       </p:pic>
-      <p:sp>
-        <p:nvSpPr>
-          <p:cNvPr id="5" name="Title 1"/>
-          <p:cNvSpPr>
-            <a:spLocks noGrp="1"/>
-          </p:cNvSpPr>
-          <p:nvPr>
-            <p:ph type="title"/>
-          </p:nvPr>
-        </p:nvSpPr>
-        <p:spPr>
-          <a:xfrm>
-            <a:off x="533400" y="228600"/>
-            <a:ext cx="8229600" cy="1143000"/>
-          </a:xfrm>
-        </p:spPr>
-        <p:txBody>
-          <a:bodyPr/>
-          <a:lstStyle/>
-          <a:p>
-            <a:r>
-              <a:rPr lang="en-US" dirty="0" smtClean="0"/>
-              <a:t>Controller</a:t>
-            </a:r>
-            <a:endParaRPr lang="en-US" dirty="0"/>
-          </a:p>
-        </p:txBody>
-      </p:sp>
     </p:spTree>
     <p:extLst>
       <p:ext uri="{BB962C8B-B14F-4D97-AF65-F5344CB8AC3E}">
@@ -7970,7 +7869,7 @@
       </p:sp>
       <p:pic>
         <p:nvPicPr>
-          <p:cNvPr id="5122" name="Picture 2"/>
+          <p:cNvPr id="2051" name="Picture 3"/>
           <p:cNvPicPr>
             <a:picLocks noChangeAspect="1" noChangeArrowheads="1"/>
           </p:cNvPicPr>
@@ -7991,8 +7890,8 @@
         </p:blipFill>
         <p:spPr bwMode="auto">
           <a:xfrm>
-            <a:off x="1859800" y="847725"/>
-            <a:ext cx="5424400" cy="5934075"/>
+            <a:off x="1857375" y="847725"/>
+            <a:ext cx="5429250" cy="5934075"/>
           </a:xfrm>
           <a:prstGeom prst="rect">
             <a:avLst/>
@@ -8047,10 +7946,10 @@
   <a:themeElements>
     <a:clrScheme name="Perspective">
       <a:dk1>
-        <a:sysClr val="windowText" lastClr="000000"/>
+        <a:sysClr val="windowText" lastClr="53504C"/>
       </a:dk1>
       <a:lt1>
-        <a:sysClr val="window" lastClr="FFFFFF"/>
+        <a:sysClr val="window" lastClr="F9F8F7"/>
       </a:lt1>
       <a:dk2>
         <a:srgbClr val="283138"/>
@@ -8337,10 +8236,10 @@
   <a:themeElements>
     <a:clrScheme name="Office">
       <a:dk1>
-        <a:sysClr val="windowText" lastClr="000000"/>
+        <a:sysClr val="windowText" lastClr="53504C"/>
       </a:dk1>
       <a:lt1>
-        <a:sysClr val="window" lastClr="FFFFFF"/>
+        <a:sysClr val="window" lastClr="F9F8F7"/>
       </a:lt1>
       <a:dk2>
         <a:srgbClr val="1F497D"/>
@@ -8622,10 +8521,10 @@
   <a:themeElements>
     <a:clrScheme name="Office">
       <a:dk1>
-        <a:sysClr val="windowText" lastClr="000000"/>
+        <a:sysClr val="windowText" lastClr="53504C"/>
       </a:dk1>
       <a:lt1>
-        <a:sysClr val="window" lastClr="FFFFFF"/>
+        <a:sysClr val="window" lastClr="F9F8F7"/>
       </a:lt1>
       <a:dk2>
         <a:srgbClr val="1F497D"/>

</xml_diff>

<commit_message>
Added CRUD slides to powerpoint
</commit_message>
<xml_diff>
--- a/3610 Presentation.pptx
+++ b/3610 Presentation.pptx
@@ -6,7 +6,7 @@
     <p:sldMasterId id="2147483768" r:id="rId2"/>
   </p:sldMasterIdLst>
   <p:notesMasterIdLst>
-    <p:notesMasterId r:id="rId15"/>
+    <p:notesMasterId r:id="rId21"/>
   </p:notesMasterIdLst>
   <p:sldIdLst>
     <p:sldId id="268" r:id="rId3"/>
@@ -20,7 +20,13 @@
     <p:sldId id="263" r:id="rId11"/>
     <p:sldId id="265" r:id="rId12"/>
     <p:sldId id="266" r:id="rId13"/>
-    <p:sldId id="269" r:id="rId14"/>
+    <p:sldId id="275" r:id="rId14"/>
+    <p:sldId id="270" r:id="rId15"/>
+    <p:sldId id="271" r:id="rId16"/>
+    <p:sldId id="272" r:id="rId17"/>
+    <p:sldId id="273" r:id="rId18"/>
+    <p:sldId id="274" r:id="rId19"/>
+    <p:sldId id="269" r:id="rId20"/>
   </p:sldIdLst>
   <p:sldSz cx="9144000" cy="6858000" type="screen4x3"/>
   <p:notesSz cx="6858000" cy="9144000"/>
@@ -119,6 +125,22 @@
       </a:defRPr>
     </a:lvl9pPr>
   </p:defaultTextStyle>
+  <p:extLst>
+    <p:ext uri="{EFAFB233-063F-42B5-8137-9DF3F51BA10A}">
+      <p15:sldGuideLst xmlns:p15="http://schemas.microsoft.com/office/powerpoint/2012/main">
+        <p15:guide id="1" orient="horz" pos="2160">
+          <p15:clr>
+            <a:srgbClr val="A4A3A4"/>
+          </p15:clr>
+        </p15:guide>
+        <p15:guide id="2" pos="2880">
+          <p15:clr>
+            <a:srgbClr val="A4A3A4"/>
+          </p15:clr>
+        </p15:guide>
+      </p15:sldGuideLst>
+    </p:ext>
+  </p:extLst>
 </p:presentation>
 </file>
 
@@ -6950,6 +6972,551 @@
             <p:ph type="title"/>
           </p:nvPr>
         </p:nvSpPr>
+        <p:spPr/>
+        <p:txBody>
+          <a:bodyPr/>
+          <a:lstStyle/>
+          <a:p>
+            <a:r>
+              <a:rPr lang="en-US" dirty="0" smtClean="0"/>
+              <a:t>ORM – </a:t>
+            </a:r>
+            <a:r>
+              <a:rPr lang="en-US" smtClean="0"/>
+              <a:t>Entity Framework</a:t>
+            </a:r>
+            <a:endParaRPr lang="en-US"/>
+          </a:p>
+        </p:txBody>
+      </p:sp>
+      <p:sp>
+        <p:nvSpPr>
+          <p:cNvPr id="3" name="Content Placeholder 2"/>
+          <p:cNvSpPr>
+            <a:spLocks noGrp="1"/>
+          </p:cNvSpPr>
+          <p:nvPr>
+            <p:ph idx="1"/>
+          </p:nvPr>
+        </p:nvSpPr>
+        <p:spPr/>
+        <p:txBody>
+          <a:bodyPr>
+            <a:normAutofit fontScale="92500" lnSpcReduction="10000"/>
+          </a:bodyPr>
+          <a:lstStyle/>
+          <a:p>
+            <a:r>
+              <a:rPr lang="en-US" dirty="0" smtClean="0"/>
+              <a:t>Uses simple common syntax (LINQ</a:t>
+            </a:r>
+            <a:r>
+              <a:rPr lang="en-US" dirty="0" smtClean="0"/>
+              <a:t>) </a:t>
+            </a:r>
+            <a:r>
+              <a:rPr lang="en-US" dirty="0" smtClean="0"/>
+              <a:t>to Add/Modify/Delete/Update </a:t>
+            </a:r>
+            <a:r>
+              <a:rPr lang="en-US" dirty="0" smtClean="0"/>
+              <a:t>objects. </a:t>
+            </a:r>
+          </a:p>
+          <a:p>
+            <a:pPr lvl="1"/>
+            <a:r>
+              <a:rPr lang="en-US" dirty="0" smtClean="0"/>
+              <a:t>No need to deal with writing SQL</a:t>
+            </a:r>
+            <a:endParaRPr lang="en-US" dirty="0" smtClean="0"/>
+          </a:p>
+          <a:p>
+            <a:endParaRPr lang="en-US" dirty="0" smtClean="0"/>
+          </a:p>
+          <a:p>
+            <a:r>
+              <a:rPr lang="en-US" dirty="0" smtClean="0"/>
+              <a:t>Handles object-relational </a:t>
+            </a:r>
+            <a:r>
+              <a:rPr lang="en-US" dirty="0"/>
+              <a:t>mapping (ORM) </a:t>
+            </a:r>
+            <a:r>
+              <a:rPr lang="en-US" dirty="0" smtClean="0"/>
+              <a:t>on its own</a:t>
+            </a:r>
+            <a:r>
+              <a:rPr lang="en-US" dirty="0" smtClean="0"/>
+              <a:t>.</a:t>
+            </a:r>
+          </a:p>
+          <a:p>
+            <a:endParaRPr lang="en-US" dirty="0"/>
+          </a:p>
+          <a:p>
+            <a:r>
+              <a:rPr lang="en-US" dirty="0"/>
+              <a:t>Builds </a:t>
+            </a:r>
+            <a:r>
+              <a:rPr lang="en-US" dirty="0" smtClean="0"/>
+              <a:t>scaffolding </a:t>
+            </a:r>
+            <a:r>
+              <a:rPr lang="en-US" dirty="0"/>
+              <a:t>for controllers and </a:t>
+            </a:r>
+            <a:r>
+              <a:rPr lang="en-US" dirty="0" smtClean="0"/>
+              <a:t>views based on models</a:t>
+            </a:r>
+            <a:endParaRPr lang="en-US" dirty="0"/>
+          </a:p>
+        </p:txBody>
+      </p:sp>
+    </p:spTree>
+    <p:extLst>
+      <p:ext uri="{BB962C8B-B14F-4D97-AF65-F5344CB8AC3E}">
+        <p14:creationId xmlns:p14="http://schemas.microsoft.com/office/powerpoint/2010/main" val="3506269559"/>
+      </p:ext>
+    </p:extLst>
+  </p:cSld>
+  <p:clrMapOvr>
+    <a:masterClrMapping/>
+  </p:clrMapOvr>
+</p:sld>
+</file>
+
+<file path=ppt/slides/slide13.xml><?xml version="1.0" encoding="utf-8"?>
+<p:sld xmlns:a="http://schemas.openxmlformats.org/drawingml/2006/main" xmlns:r="http://schemas.openxmlformats.org/officeDocument/2006/relationships" xmlns:p="http://schemas.openxmlformats.org/presentationml/2006/main">
+  <p:cSld>
+    <p:spTree>
+      <p:nvGrpSpPr>
+        <p:cNvPr id="1" name=""/>
+        <p:cNvGrpSpPr/>
+        <p:nvPr/>
+      </p:nvGrpSpPr>
+      <p:grpSpPr>
+        <a:xfrm>
+          <a:off x="0" y="0"/>
+          <a:ext cx="0" cy="0"/>
+          <a:chOff x="0" y="0"/>
+          <a:chExt cx="0" cy="0"/>
+        </a:xfrm>
+      </p:grpSpPr>
+      <p:sp>
+        <p:nvSpPr>
+          <p:cNvPr id="2" name="Title 1"/>
+          <p:cNvSpPr>
+            <a:spLocks noGrp="1"/>
+          </p:cNvSpPr>
+          <p:nvPr>
+            <p:ph type="title"/>
+          </p:nvPr>
+        </p:nvSpPr>
+        <p:spPr/>
+        <p:txBody>
+          <a:bodyPr/>
+          <a:lstStyle/>
+          <a:p>
+            <a:r>
+              <a:rPr lang="en-US" dirty="0" smtClean="0"/>
+              <a:t>Asset Models – CRUD</a:t>
+            </a:r>
+            <a:endParaRPr lang="en-US" dirty="0"/>
+          </a:p>
+        </p:txBody>
+      </p:sp>
+      <p:pic>
+        <p:nvPicPr>
+          <p:cNvPr id="4" name="Picture 3"/>
+          <p:cNvPicPr>
+            <a:picLocks noChangeAspect="1"/>
+          </p:cNvPicPr>
+          <p:nvPr/>
+        </p:nvPicPr>
+        <p:blipFill>
+          <a:blip r:embed="rId2"/>
+          <a:stretch>
+            <a:fillRect/>
+          </a:stretch>
+        </p:blipFill>
+        <p:spPr>
+          <a:xfrm>
+            <a:off x="1104900" y="1219200"/>
+            <a:ext cx="6934200" cy="5470432"/>
+          </a:xfrm>
+          <a:prstGeom prst="rect">
+            <a:avLst/>
+          </a:prstGeom>
+        </p:spPr>
+      </p:pic>
+    </p:spTree>
+    <p:extLst>
+      <p:ext uri="{BB962C8B-B14F-4D97-AF65-F5344CB8AC3E}">
+        <p14:creationId xmlns:p14="http://schemas.microsoft.com/office/powerpoint/2010/main" val="403398819"/>
+      </p:ext>
+    </p:extLst>
+  </p:cSld>
+  <p:clrMapOvr>
+    <a:masterClrMapping/>
+  </p:clrMapOvr>
+</p:sld>
+</file>
+
+<file path=ppt/slides/slide14.xml><?xml version="1.0" encoding="utf-8"?>
+<p:sld xmlns:a="http://schemas.openxmlformats.org/drawingml/2006/main" xmlns:r="http://schemas.openxmlformats.org/officeDocument/2006/relationships" xmlns:p="http://schemas.openxmlformats.org/presentationml/2006/main">
+  <p:cSld>
+    <p:spTree>
+      <p:nvGrpSpPr>
+        <p:cNvPr id="1" name=""/>
+        <p:cNvGrpSpPr/>
+        <p:nvPr/>
+      </p:nvGrpSpPr>
+      <p:grpSpPr>
+        <a:xfrm>
+          <a:off x="0" y="0"/>
+          <a:ext cx="0" cy="0"/>
+          <a:chOff x="0" y="0"/>
+          <a:chExt cx="0" cy="0"/>
+        </a:xfrm>
+      </p:grpSpPr>
+      <p:sp>
+        <p:nvSpPr>
+          <p:cNvPr id="2" name="Title 1"/>
+          <p:cNvSpPr>
+            <a:spLocks noGrp="1"/>
+          </p:cNvSpPr>
+          <p:nvPr>
+            <p:ph type="title"/>
+          </p:nvPr>
+        </p:nvSpPr>
+        <p:spPr/>
+        <p:txBody>
+          <a:bodyPr/>
+          <a:lstStyle/>
+          <a:p>
+            <a:r>
+              <a:rPr lang="en-US" dirty="0" smtClean="0"/>
+              <a:t>Asset Models - CRUD</a:t>
+            </a:r>
+            <a:endParaRPr lang="en-US" dirty="0"/>
+          </a:p>
+        </p:txBody>
+      </p:sp>
+      <p:pic>
+        <p:nvPicPr>
+          <p:cNvPr id="5" name="Picture 4"/>
+          <p:cNvPicPr>
+            <a:picLocks noChangeAspect="1"/>
+          </p:cNvPicPr>
+          <p:nvPr/>
+        </p:nvPicPr>
+        <p:blipFill>
+          <a:blip r:embed="rId2"/>
+          <a:stretch>
+            <a:fillRect/>
+          </a:stretch>
+        </p:blipFill>
+        <p:spPr>
+          <a:xfrm>
+            <a:off x="261424" y="1676400"/>
+            <a:ext cx="8621152" cy="4305300"/>
+          </a:xfrm>
+          <a:prstGeom prst="rect">
+            <a:avLst/>
+          </a:prstGeom>
+        </p:spPr>
+      </p:pic>
+    </p:spTree>
+    <p:extLst>
+      <p:ext uri="{BB962C8B-B14F-4D97-AF65-F5344CB8AC3E}">
+        <p14:creationId xmlns:p14="http://schemas.microsoft.com/office/powerpoint/2010/main" val="2655739801"/>
+      </p:ext>
+    </p:extLst>
+  </p:cSld>
+  <p:clrMapOvr>
+    <a:masterClrMapping/>
+  </p:clrMapOvr>
+</p:sld>
+</file>
+
+<file path=ppt/slides/slide15.xml><?xml version="1.0" encoding="utf-8"?>
+<p:sld xmlns:a="http://schemas.openxmlformats.org/drawingml/2006/main" xmlns:r="http://schemas.openxmlformats.org/officeDocument/2006/relationships" xmlns:p="http://schemas.openxmlformats.org/presentationml/2006/main">
+  <p:cSld>
+    <p:spTree>
+      <p:nvGrpSpPr>
+        <p:cNvPr id="1" name=""/>
+        <p:cNvGrpSpPr/>
+        <p:nvPr/>
+      </p:nvGrpSpPr>
+      <p:grpSpPr>
+        <a:xfrm>
+          <a:off x="0" y="0"/>
+          <a:ext cx="0" cy="0"/>
+          <a:chOff x="0" y="0"/>
+          <a:chExt cx="0" cy="0"/>
+        </a:xfrm>
+      </p:grpSpPr>
+      <p:sp>
+        <p:nvSpPr>
+          <p:cNvPr id="2" name="Title 1"/>
+          <p:cNvSpPr>
+            <a:spLocks noGrp="1"/>
+          </p:cNvSpPr>
+          <p:nvPr>
+            <p:ph type="title"/>
+          </p:nvPr>
+        </p:nvSpPr>
+        <p:spPr/>
+        <p:txBody>
+          <a:bodyPr/>
+          <a:lstStyle/>
+          <a:p>
+            <a:r>
+              <a:rPr lang="en-US" dirty="0" smtClean="0"/>
+              <a:t>Asset Models - CRUD</a:t>
+            </a:r>
+            <a:endParaRPr lang="en-US" dirty="0"/>
+          </a:p>
+        </p:txBody>
+      </p:sp>
+      <p:pic>
+        <p:nvPicPr>
+          <p:cNvPr id="4" name="Picture 3"/>
+          <p:cNvPicPr>
+            <a:picLocks noChangeAspect="1"/>
+          </p:cNvPicPr>
+          <p:nvPr/>
+        </p:nvPicPr>
+        <p:blipFill>
+          <a:blip r:embed="rId2"/>
+          <a:stretch>
+            <a:fillRect/>
+          </a:stretch>
+        </p:blipFill>
+        <p:spPr>
+          <a:xfrm>
+            <a:off x="556266" y="1828800"/>
+            <a:ext cx="8031467" cy="4029075"/>
+          </a:xfrm>
+          <a:prstGeom prst="rect">
+            <a:avLst/>
+          </a:prstGeom>
+        </p:spPr>
+      </p:pic>
+    </p:spTree>
+    <p:extLst>
+      <p:ext uri="{BB962C8B-B14F-4D97-AF65-F5344CB8AC3E}">
+        <p14:creationId xmlns:p14="http://schemas.microsoft.com/office/powerpoint/2010/main" val="4007096409"/>
+      </p:ext>
+    </p:extLst>
+  </p:cSld>
+  <p:clrMapOvr>
+    <a:masterClrMapping/>
+  </p:clrMapOvr>
+</p:sld>
+</file>
+
+<file path=ppt/slides/slide16.xml><?xml version="1.0" encoding="utf-8"?>
+<p:sld xmlns:a="http://schemas.openxmlformats.org/drawingml/2006/main" xmlns:r="http://schemas.openxmlformats.org/officeDocument/2006/relationships" xmlns:p="http://schemas.openxmlformats.org/presentationml/2006/main">
+  <p:cSld>
+    <p:spTree>
+      <p:nvGrpSpPr>
+        <p:cNvPr id="1" name=""/>
+        <p:cNvGrpSpPr/>
+        <p:nvPr/>
+      </p:nvGrpSpPr>
+      <p:grpSpPr>
+        <a:xfrm>
+          <a:off x="0" y="0"/>
+          <a:ext cx="0" cy="0"/>
+          <a:chOff x="0" y="0"/>
+          <a:chExt cx="0" cy="0"/>
+        </a:xfrm>
+      </p:grpSpPr>
+      <p:sp>
+        <p:nvSpPr>
+          <p:cNvPr id="2" name="Title 1"/>
+          <p:cNvSpPr>
+            <a:spLocks noGrp="1"/>
+          </p:cNvSpPr>
+          <p:nvPr>
+            <p:ph type="title"/>
+          </p:nvPr>
+        </p:nvSpPr>
+        <p:spPr/>
+        <p:txBody>
+          <a:bodyPr/>
+          <a:lstStyle/>
+          <a:p>
+            <a:r>
+              <a:rPr lang="en-US" dirty="0" smtClean="0"/>
+              <a:t>Asset Models – Edit View</a:t>
+            </a:r>
+            <a:endParaRPr lang="en-US" dirty="0"/>
+          </a:p>
+        </p:txBody>
+      </p:sp>
+      <p:pic>
+        <p:nvPicPr>
+          <p:cNvPr id="4" name="Picture 3"/>
+          <p:cNvPicPr>
+            <a:picLocks noChangeAspect="1"/>
+          </p:cNvPicPr>
+          <p:nvPr/>
+        </p:nvPicPr>
+        <p:blipFill>
+          <a:blip r:embed="rId2"/>
+          <a:stretch>
+            <a:fillRect/>
+          </a:stretch>
+        </p:blipFill>
+        <p:spPr>
+          <a:xfrm>
+            <a:off x="495300" y="1295400"/>
+            <a:ext cx="8475330" cy="5181600"/>
+          </a:xfrm>
+          <a:prstGeom prst="rect">
+            <a:avLst/>
+          </a:prstGeom>
+        </p:spPr>
+      </p:pic>
+    </p:spTree>
+    <p:extLst>
+      <p:ext uri="{BB962C8B-B14F-4D97-AF65-F5344CB8AC3E}">
+        <p14:creationId xmlns:p14="http://schemas.microsoft.com/office/powerpoint/2010/main" val="3696965305"/>
+      </p:ext>
+    </p:extLst>
+  </p:cSld>
+  <p:clrMapOvr>
+    <a:masterClrMapping/>
+  </p:clrMapOvr>
+  <p:timing>
+    <p:tnLst>
+      <p:par>
+        <p:cTn id="1" dur="indefinite" restart="never" nodeType="tmRoot"/>
+      </p:par>
+    </p:tnLst>
+  </p:timing>
+</p:sld>
+</file>
+
+<file path=ppt/slides/slide17.xml><?xml version="1.0" encoding="utf-8"?>
+<p:sld xmlns:a="http://schemas.openxmlformats.org/drawingml/2006/main" xmlns:r="http://schemas.openxmlformats.org/officeDocument/2006/relationships" xmlns:p="http://schemas.openxmlformats.org/presentationml/2006/main">
+  <p:cSld>
+    <p:spTree>
+      <p:nvGrpSpPr>
+        <p:cNvPr id="1" name=""/>
+        <p:cNvGrpSpPr/>
+        <p:nvPr/>
+      </p:nvGrpSpPr>
+      <p:grpSpPr>
+        <a:xfrm>
+          <a:off x="0" y="0"/>
+          <a:ext cx="0" cy="0"/>
+          <a:chOff x="0" y="0"/>
+          <a:chExt cx="0" cy="0"/>
+        </a:xfrm>
+      </p:grpSpPr>
+      <p:sp>
+        <p:nvSpPr>
+          <p:cNvPr id="2" name="Title 1"/>
+          <p:cNvSpPr>
+            <a:spLocks noGrp="1"/>
+          </p:cNvSpPr>
+          <p:nvPr>
+            <p:ph type="title"/>
+          </p:nvPr>
+        </p:nvSpPr>
+        <p:spPr/>
+        <p:txBody>
+          <a:bodyPr>
+            <a:normAutofit/>
+          </a:bodyPr>
+          <a:lstStyle/>
+          <a:p>
+            <a:r>
+              <a:rPr lang="en-US" dirty="0" smtClean="0"/>
+              <a:t>Asset Models – Edit View</a:t>
+            </a:r>
+            <a:endParaRPr lang="en-US" dirty="0"/>
+          </a:p>
+        </p:txBody>
+      </p:sp>
+      <p:pic>
+        <p:nvPicPr>
+          <p:cNvPr id="4" name="Picture 3"/>
+          <p:cNvPicPr>
+            <a:picLocks noChangeAspect="1"/>
+          </p:cNvPicPr>
+          <p:nvPr/>
+        </p:nvPicPr>
+        <p:blipFill>
+          <a:blip r:embed="rId2"/>
+          <a:stretch>
+            <a:fillRect/>
+          </a:stretch>
+        </p:blipFill>
+        <p:spPr>
+          <a:xfrm>
+            <a:off x="152400" y="1828800"/>
+            <a:ext cx="9601200" cy="3581400"/>
+          </a:xfrm>
+          <a:prstGeom prst="rect">
+            <a:avLst/>
+          </a:prstGeom>
+        </p:spPr>
+      </p:pic>
+    </p:spTree>
+    <p:extLst>
+      <p:ext uri="{BB962C8B-B14F-4D97-AF65-F5344CB8AC3E}">
+        <p14:creationId xmlns:p14="http://schemas.microsoft.com/office/powerpoint/2010/main" val="1633388588"/>
+      </p:ext>
+    </p:extLst>
+  </p:cSld>
+  <p:clrMapOvr>
+    <a:masterClrMapping/>
+  </p:clrMapOvr>
+  <p:timing>
+    <p:tnLst>
+      <p:par>
+        <p:cTn id="1" dur="indefinite" restart="never" nodeType="tmRoot"/>
+      </p:par>
+    </p:tnLst>
+  </p:timing>
+</p:sld>
+</file>
+
+<file path=ppt/slides/slide18.xml><?xml version="1.0" encoding="utf-8"?>
+<p:sld xmlns:a="http://schemas.openxmlformats.org/drawingml/2006/main" xmlns:r="http://schemas.openxmlformats.org/officeDocument/2006/relationships" xmlns:p="http://schemas.openxmlformats.org/presentationml/2006/main">
+  <p:cSld>
+    <p:spTree>
+      <p:nvGrpSpPr>
+        <p:cNvPr id="1" name=""/>
+        <p:cNvGrpSpPr/>
+        <p:nvPr/>
+      </p:nvGrpSpPr>
+      <p:grpSpPr>
+        <a:xfrm>
+          <a:off x="0" y="0"/>
+          <a:ext cx="0" cy="0"/>
+          <a:chOff x="0" y="0"/>
+          <a:chExt cx="0" cy="0"/>
+        </a:xfrm>
+      </p:grpSpPr>
+      <p:sp>
+        <p:nvSpPr>
+          <p:cNvPr id="2" name="Title 1"/>
+          <p:cNvSpPr>
+            <a:spLocks noGrp="1"/>
+          </p:cNvSpPr>
+          <p:nvPr>
+            <p:ph type="title"/>
+          </p:nvPr>
+        </p:nvSpPr>
         <p:spPr>
           <a:xfrm>
             <a:off x="228600" y="17253"/>
@@ -7946,10 +8513,10 @@
   <a:themeElements>
     <a:clrScheme name="Perspective">
       <a:dk1>
-        <a:sysClr val="windowText" lastClr="53504C"/>
+        <a:sysClr val="windowText" lastClr="000000"/>
       </a:dk1>
       <a:lt1>
-        <a:sysClr val="window" lastClr="F9F8F7"/>
+        <a:sysClr val="window" lastClr="FFFFFF"/>
       </a:lt1>
       <a:dk2>
         <a:srgbClr val="283138"/>
@@ -8236,10 +8803,10 @@
   <a:themeElements>
     <a:clrScheme name="Office">
       <a:dk1>
-        <a:sysClr val="windowText" lastClr="53504C"/>
+        <a:sysClr val="windowText" lastClr="000000"/>
       </a:dk1>
       <a:lt1>
-        <a:sysClr val="window" lastClr="F9F8F7"/>
+        <a:sysClr val="window" lastClr="FFFFFF"/>
       </a:lt1>
       <a:dk2>
         <a:srgbClr val="1F497D"/>
@@ -8521,10 +9088,10 @@
   <a:themeElements>
     <a:clrScheme name="Office">
       <a:dk1>
-        <a:sysClr val="windowText" lastClr="53504C"/>
+        <a:sysClr val="windowText" lastClr="000000"/>
       </a:dk1>
       <a:lt1>
-        <a:sysClr val="window" lastClr="F9F8F7"/>
+        <a:sysClr val="window" lastClr="FFFFFF"/>
       </a:lt1>
       <a:dk2>
         <a:srgbClr val="1F497D"/>

</xml_diff>

<commit_message>
Added Home and Index slides
</commit_message>
<xml_diff>
--- a/3610 Presentation.pptx
+++ b/3610 Presentation.pptx
@@ -6,27 +6,29 @@
     <p:sldMasterId id="2147483768" r:id="rId2"/>
   </p:sldMasterIdLst>
   <p:notesMasterIdLst>
-    <p:notesMasterId r:id="rId21"/>
+    <p:notesMasterId r:id="rId23"/>
   </p:notesMasterIdLst>
   <p:sldIdLst>
     <p:sldId id="268" r:id="rId3"/>
     <p:sldId id="267" r:id="rId4"/>
-    <p:sldId id="258" r:id="rId5"/>
-    <p:sldId id="260" r:id="rId6"/>
-    <p:sldId id="257" r:id="rId7"/>
-    <p:sldId id="259" r:id="rId8"/>
-    <p:sldId id="262" r:id="rId9"/>
-    <p:sldId id="264" r:id="rId10"/>
-    <p:sldId id="263" r:id="rId11"/>
-    <p:sldId id="265" r:id="rId12"/>
-    <p:sldId id="266" r:id="rId13"/>
-    <p:sldId id="275" r:id="rId14"/>
-    <p:sldId id="270" r:id="rId15"/>
-    <p:sldId id="271" r:id="rId16"/>
-    <p:sldId id="272" r:id="rId17"/>
-    <p:sldId id="273" r:id="rId18"/>
-    <p:sldId id="274" r:id="rId19"/>
-    <p:sldId id="269" r:id="rId20"/>
+    <p:sldId id="276" r:id="rId5"/>
+    <p:sldId id="277" r:id="rId6"/>
+    <p:sldId id="258" r:id="rId7"/>
+    <p:sldId id="260" r:id="rId8"/>
+    <p:sldId id="257" r:id="rId9"/>
+    <p:sldId id="259" r:id="rId10"/>
+    <p:sldId id="262" r:id="rId11"/>
+    <p:sldId id="264" r:id="rId12"/>
+    <p:sldId id="263" r:id="rId13"/>
+    <p:sldId id="265" r:id="rId14"/>
+    <p:sldId id="266" r:id="rId15"/>
+    <p:sldId id="275" r:id="rId16"/>
+    <p:sldId id="270" r:id="rId17"/>
+    <p:sldId id="271" r:id="rId18"/>
+    <p:sldId id="272" r:id="rId19"/>
+    <p:sldId id="273" r:id="rId20"/>
+    <p:sldId id="274" r:id="rId21"/>
+    <p:sldId id="269" r:id="rId22"/>
   </p:sldIdLst>
   <p:sldSz cx="9144000" cy="6858000" type="screen4x3"/>
   <p:notesSz cx="6858000" cy="9144000"/>
@@ -127,7 +129,7 @@
   </p:defaultTextStyle>
   <p:extLst>
     <p:ext uri="{EFAFB233-063F-42B5-8137-9DF3F51BA10A}">
-      <p15:sldGuideLst xmlns:p15="http://schemas.microsoft.com/office/powerpoint/2012/main">
+      <p15:sldGuideLst xmlns:p15="http://schemas.microsoft.com/office/powerpoint/2012/main" xmlns="">
         <p15:guide id="1" orient="horz" pos="2160">
           <p15:clr>
             <a:srgbClr val="A4A3A4"/>
@@ -559,7 +561,7 @@
           <a:p>
             <a:fld id="{20A4151E-10FD-415C-8555-A491F065CF6B}" type="slidenum">
               <a:rPr lang="en-US" smtClean="0"/>
-              <a:t>10</a:t>
+              <a:t>12</a:t>
             </a:fld>
             <a:endParaRPr lang="en-US"/>
           </a:p>
@@ -6668,6 +6670,187 @@
       </p:grpSpPr>
       <p:sp>
         <p:nvSpPr>
+          <p:cNvPr id="4" name="Title 3"/>
+          <p:cNvSpPr>
+            <a:spLocks noGrp="1"/>
+          </p:cNvSpPr>
+          <p:nvPr>
+            <p:ph type="ctrTitle"/>
+          </p:nvPr>
+        </p:nvSpPr>
+        <p:spPr/>
+        <p:txBody>
+          <a:bodyPr/>
+          <a:lstStyle/>
+          <a:p>
+            <a:r>
+              <a:rPr lang="en-US" dirty="0" smtClean="0"/>
+              <a:t>Edit</a:t>
+            </a:r>
+            <a:endParaRPr lang="en-US" dirty="0"/>
+          </a:p>
+        </p:txBody>
+      </p:sp>
+    </p:spTree>
+    <p:extLst>
+      <p:ext uri="{BB962C8B-B14F-4D97-AF65-F5344CB8AC3E}">
+        <p14:creationId xmlns:p14="http://schemas.microsoft.com/office/powerpoint/2010/main" val="238809020"/>
+      </p:ext>
+    </p:extLst>
+  </p:cSld>
+  <p:clrMapOvr>
+    <a:masterClrMapping/>
+  </p:clrMapOvr>
+  <p:timing>
+    <p:tnLst>
+      <p:par>
+        <p:cTn id="1" dur="indefinite" restart="never" nodeType="tmRoot"/>
+      </p:par>
+    </p:tnLst>
+  </p:timing>
+</p:sld>
+</file>
+
+<file path=ppt/slides/slide11.xml><?xml version="1.0" encoding="utf-8"?>
+<p:sld xmlns:a="http://schemas.openxmlformats.org/drawingml/2006/main" xmlns:r="http://schemas.openxmlformats.org/officeDocument/2006/relationships" xmlns:p="http://schemas.openxmlformats.org/presentationml/2006/main">
+  <p:cSld>
+    <p:spTree>
+      <p:nvGrpSpPr>
+        <p:cNvPr id="1" name=""/>
+        <p:cNvGrpSpPr/>
+        <p:nvPr/>
+      </p:nvGrpSpPr>
+      <p:grpSpPr>
+        <a:xfrm>
+          <a:off x="0" y="0"/>
+          <a:ext cx="0" cy="0"/>
+          <a:chOff x="0" y="0"/>
+          <a:chExt cx="0" cy="0"/>
+        </a:xfrm>
+      </p:grpSpPr>
+      <p:sp>
+        <p:nvSpPr>
+          <p:cNvPr id="5" name="Title 1"/>
+          <p:cNvSpPr>
+            <a:spLocks noGrp="1"/>
+          </p:cNvSpPr>
+          <p:nvPr>
+            <p:ph type="title"/>
+          </p:nvPr>
+        </p:nvSpPr>
+        <p:spPr>
+          <a:xfrm>
+            <a:off x="457200" y="228600"/>
+            <a:ext cx="8229600" cy="609600"/>
+          </a:xfrm>
+        </p:spPr>
+        <p:txBody>
+          <a:bodyPr>
+            <a:normAutofit fontScale="90000"/>
+          </a:bodyPr>
+          <a:lstStyle/>
+          <a:p>
+            <a:r>
+              <a:rPr lang="en-US" dirty="0" smtClean="0"/>
+              <a:t>Controller</a:t>
+            </a:r>
+            <a:endParaRPr lang="en-US" dirty="0"/>
+          </a:p>
+        </p:txBody>
+      </p:sp>
+      <p:pic>
+        <p:nvPicPr>
+          <p:cNvPr id="2051" name="Picture 3"/>
+          <p:cNvPicPr>
+            <a:picLocks noChangeAspect="1" noChangeArrowheads="1"/>
+          </p:cNvPicPr>
+          <p:nvPr/>
+        </p:nvPicPr>
+        <p:blipFill>
+          <a:blip r:embed="rId2">
+            <a:extLst>
+              <a:ext uri="{28A0092B-C50C-407E-A947-70E740481C1C}">
+                <a14:useLocalDpi xmlns:a14="http://schemas.microsoft.com/office/drawing/2010/main" val="0"/>
+              </a:ext>
+            </a:extLst>
+          </a:blip>
+          <a:srcRect/>
+          <a:stretch>
+            <a:fillRect/>
+          </a:stretch>
+        </p:blipFill>
+        <p:spPr bwMode="auto">
+          <a:xfrm>
+            <a:off x="1857375" y="847725"/>
+            <a:ext cx="5429250" cy="5934075"/>
+          </a:xfrm>
+          <a:prstGeom prst="rect">
+            <a:avLst/>
+          </a:prstGeom>
+          <a:noFill/>
+          <a:ln>
+            <a:noFill/>
+          </a:ln>
+          <a:extLst>
+            <a:ext uri="{909E8E84-426E-40DD-AFC4-6F175D3DCCD1}">
+              <a14:hiddenFill xmlns:a14="http://schemas.microsoft.com/office/drawing/2010/main">
+                <a:solidFill>
+                  <a:schemeClr val="accent1"/>
+                </a:solidFill>
+              </a14:hiddenFill>
+            </a:ext>
+            <a:ext uri="{91240B29-F687-4F45-9708-019B960494DF}">
+              <a14:hiddenLine xmlns:a14="http://schemas.microsoft.com/office/drawing/2010/main" w="9525">
+                <a:solidFill>
+                  <a:schemeClr val="tx1"/>
+                </a:solidFill>
+                <a:miter lim="800000"/>
+                <a:headEnd/>
+                <a:tailEnd/>
+              </a14:hiddenLine>
+            </a:ext>
+          </a:extLst>
+        </p:spPr>
+      </p:pic>
+    </p:spTree>
+    <p:extLst>
+      <p:ext uri="{BB962C8B-B14F-4D97-AF65-F5344CB8AC3E}">
+        <p14:creationId xmlns:p14="http://schemas.microsoft.com/office/powerpoint/2010/main" val="2170860700"/>
+      </p:ext>
+    </p:extLst>
+  </p:cSld>
+  <p:clrMapOvr>
+    <a:masterClrMapping/>
+  </p:clrMapOvr>
+  <p:timing>
+    <p:tnLst>
+      <p:par>
+        <p:cTn id="1" dur="indefinite" restart="never" nodeType="tmRoot"/>
+      </p:par>
+    </p:tnLst>
+  </p:timing>
+</p:sld>
+</file>
+
+<file path=ppt/slides/slide12.xml><?xml version="1.0" encoding="utf-8"?>
+<p:sld xmlns:a="http://schemas.openxmlformats.org/drawingml/2006/main" xmlns:r="http://schemas.openxmlformats.org/officeDocument/2006/relationships" xmlns:p="http://schemas.openxmlformats.org/presentationml/2006/main">
+  <p:cSld>
+    <p:spTree>
+      <p:nvGrpSpPr>
+        <p:cNvPr id="1" name=""/>
+        <p:cNvGrpSpPr/>
+        <p:nvPr/>
+      </p:nvGrpSpPr>
+      <p:grpSpPr>
+        <a:xfrm>
+          <a:off x="0" y="0"/>
+          <a:ext cx="0" cy="0"/>
+          <a:chOff x="0" y="0"/>
+          <a:chExt cx="0" cy="0"/>
+        </a:xfrm>
+      </p:grpSpPr>
+      <p:sp>
+        <p:nvSpPr>
           <p:cNvPr id="5" name="Title 1"/>
           <p:cNvSpPr>
             <a:spLocks noGrp="1"/>
@@ -6824,7 +7007,7 @@
 </p:sld>
 </file>
 
-<file path=ppt/slides/slide11.xml><?xml version="1.0" encoding="utf-8"?>
+<file path=ppt/slides/slide13.xml><?xml version="1.0" encoding="utf-8"?>
 <p:sld xmlns:a="http://schemas.openxmlformats.org/drawingml/2006/main" xmlns:r="http://schemas.openxmlformats.org/officeDocument/2006/relationships" xmlns:p="http://schemas.openxmlformats.org/presentationml/2006/main">
   <p:cSld>
     <p:spTree>
@@ -6945,7 +7128,7 @@
 </p:sld>
 </file>
 
-<file path=ppt/slides/slide12.xml><?xml version="1.0" encoding="utf-8"?>
+<file path=ppt/slides/slide14.xml><?xml version="1.0" encoding="utf-8"?>
 <p:sld xmlns:a="http://schemas.openxmlformats.org/drawingml/2006/main" xmlns:r="http://schemas.openxmlformats.org/officeDocument/2006/relationships" xmlns:p="http://schemas.openxmlformats.org/presentationml/2006/main">
   <p:cSld>
     <p:spTree>
@@ -7008,19 +7191,7 @@
           <a:p>
             <a:r>
               <a:rPr lang="en-US" dirty="0" smtClean="0"/>
-              <a:t>Uses simple common syntax (LINQ</a:t>
-            </a:r>
-            <a:r>
-              <a:rPr lang="en-US" dirty="0" smtClean="0"/>
-              <a:t>) </a:t>
-            </a:r>
-            <a:r>
-              <a:rPr lang="en-US" dirty="0" smtClean="0"/>
-              <a:t>to Add/Modify/Delete/Update </a:t>
-            </a:r>
-            <a:r>
-              <a:rPr lang="en-US" dirty="0" smtClean="0"/>
-              <a:t>objects. </a:t>
+              <a:t>Uses simple common syntax (LINQ) to Add/Modify/Delete/Update objects. </a:t>
             </a:r>
           </a:p>
           <a:p>
@@ -7029,7 +7200,6 @@
               <a:rPr lang="en-US" dirty="0" smtClean="0"/>
               <a:t>No need to deal with writing SQL</a:t>
             </a:r>
-            <a:endParaRPr lang="en-US" dirty="0" smtClean="0"/>
           </a:p>
           <a:p>
             <a:endParaRPr lang="en-US" dirty="0" smtClean="0"/>
@@ -7045,11 +7215,7 @@
             </a:r>
             <a:r>
               <a:rPr lang="en-US" dirty="0" smtClean="0"/>
-              <a:t>on its own</a:t>
-            </a:r>
-            <a:r>
-              <a:rPr lang="en-US" dirty="0" smtClean="0"/>
-              <a:t>.</a:t>
+              <a:t>on its own.</a:t>
             </a:r>
           </a:p>
           <a:p>
@@ -7089,7 +7255,7 @@
 </p:sld>
 </file>
 
-<file path=ppt/slides/slide13.xml><?xml version="1.0" encoding="utf-8"?>
+<file path=ppt/slides/slide15.xml><?xml version="1.0" encoding="utf-8"?>
 <p:sld xmlns:a="http://schemas.openxmlformats.org/drawingml/2006/main" xmlns:r="http://schemas.openxmlformats.org/officeDocument/2006/relationships" xmlns:p="http://schemas.openxmlformats.org/presentationml/2006/main">
   <p:cSld>
     <p:spTree>
@@ -7166,7 +7332,7 @@
 </p:sld>
 </file>
 
-<file path=ppt/slides/slide14.xml><?xml version="1.0" encoding="utf-8"?>
+<file path=ppt/slides/slide16.xml><?xml version="1.0" encoding="utf-8"?>
 <p:sld xmlns:a="http://schemas.openxmlformats.org/drawingml/2006/main" xmlns:r="http://schemas.openxmlformats.org/officeDocument/2006/relationships" xmlns:p="http://schemas.openxmlformats.org/presentationml/2006/main">
   <p:cSld>
     <p:spTree>
@@ -7243,7 +7409,7 @@
 </p:sld>
 </file>
 
-<file path=ppt/slides/slide15.xml><?xml version="1.0" encoding="utf-8"?>
+<file path=ppt/slides/slide17.xml><?xml version="1.0" encoding="utf-8"?>
 <p:sld xmlns:a="http://schemas.openxmlformats.org/drawingml/2006/main" xmlns:r="http://schemas.openxmlformats.org/officeDocument/2006/relationships" xmlns:p="http://schemas.openxmlformats.org/presentationml/2006/main">
   <p:cSld>
     <p:spTree>
@@ -7320,7 +7486,7 @@
 </p:sld>
 </file>
 
-<file path=ppt/slides/slide16.xml><?xml version="1.0" encoding="utf-8"?>
+<file path=ppt/slides/slide18.xml><?xml version="1.0" encoding="utf-8"?>
 <p:sld xmlns:a="http://schemas.openxmlformats.org/drawingml/2006/main" xmlns:r="http://schemas.openxmlformats.org/officeDocument/2006/relationships" xmlns:p="http://schemas.openxmlformats.org/presentationml/2006/main">
   <p:cSld>
     <p:spTree>
@@ -7404,7 +7570,7 @@
 </p:sld>
 </file>
 
-<file path=ppt/slides/slide17.xml><?xml version="1.0" encoding="utf-8"?>
+<file path=ppt/slides/slide19.xml><?xml version="1.0" encoding="utf-8"?>
 <p:sld xmlns:a="http://schemas.openxmlformats.org/drawingml/2006/main" xmlns:r="http://schemas.openxmlformats.org/officeDocument/2006/relationships" xmlns:p="http://schemas.openxmlformats.org/presentationml/2006/main">
   <p:cSld>
     <p:spTree>
@@ -7490,7 +7656,128 @@
 </p:sld>
 </file>
 
-<file path=ppt/slides/slide18.xml><?xml version="1.0" encoding="utf-8"?>
+<file path=ppt/slides/slide2.xml><?xml version="1.0" encoding="utf-8"?>
+<p:sld xmlns:a="http://schemas.openxmlformats.org/drawingml/2006/main" xmlns:r="http://schemas.openxmlformats.org/officeDocument/2006/relationships" xmlns:p="http://schemas.openxmlformats.org/presentationml/2006/main">
+  <p:cSld>
+    <p:spTree>
+      <p:nvGrpSpPr>
+        <p:cNvPr id="1" name=""/>
+        <p:cNvGrpSpPr/>
+        <p:nvPr/>
+      </p:nvGrpSpPr>
+      <p:grpSpPr>
+        <a:xfrm>
+          <a:off x="0" y="0"/>
+          <a:ext cx="0" cy="0"/>
+          <a:chOff x="0" y="0"/>
+          <a:chExt cx="0" cy="0"/>
+        </a:xfrm>
+      </p:grpSpPr>
+      <p:sp>
+        <p:nvSpPr>
+          <p:cNvPr id="5" name="Title 1"/>
+          <p:cNvSpPr>
+            <a:spLocks noGrp="1"/>
+          </p:cNvSpPr>
+          <p:nvPr>
+            <p:ph type="title"/>
+          </p:nvPr>
+        </p:nvSpPr>
+        <p:spPr>
+          <a:xfrm>
+            <a:off x="457200" y="228600"/>
+            <a:ext cx="8229600" cy="609600"/>
+          </a:xfrm>
+        </p:spPr>
+        <p:txBody>
+          <a:bodyPr>
+            <a:normAutofit fontScale="90000"/>
+          </a:bodyPr>
+          <a:lstStyle/>
+          <a:p>
+            <a:r>
+              <a:rPr lang="en-US" dirty="0" smtClean="0"/>
+              <a:t>Class Model/EDMX</a:t>
+            </a:r>
+            <a:endParaRPr lang="en-US" dirty="0"/>
+          </a:p>
+        </p:txBody>
+      </p:sp>
+      <p:pic>
+        <p:nvPicPr>
+          <p:cNvPr id="8194" name="Picture 2"/>
+          <p:cNvPicPr>
+            <a:picLocks noChangeAspect="1" noChangeArrowheads="1"/>
+          </p:cNvPicPr>
+          <p:nvPr/>
+        </p:nvPicPr>
+        <p:blipFill>
+          <a:blip r:embed="rId2">
+            <a:extLst>
+              <a:ext uri="{28A0092B-C50C-407E-A947-70E740481C1C}">
+                <a14:useLocalDpi xmlns:a14="http://schemas.microsoft.com/office/drawing/2010/main" val="0"/>
+              </a:ext>
+            </a:extLst>
+          </a:blip>
+          <a:srcRect/>
+          <a:stretch>
+            <a:fillRect/>
+          </a:stretch>
+        </p:blipFill>
+        <p:spPr bwMode="auto">
+          <a:xfrm>
+            <a:off x="-19907" y="938212"/>
+            <a:ext cx="9160278" cy="5310188"/>
+          </a:xfrm>
+          <a:prstGeom prst="rect">
+            <a:avLst/>
+          </a:prstGeom>
+          <a:noFill/>
+          <a:ln>
+            <a:noFill/>
+          </a:ln>
+          <a:extLst>
+            <a:ext uri="{909E8E84-426E-40DD-AFC4-6F175D3DCCD1}">
+              <a14:hiddenFill xmlns:a14="http://schemas.microsoft.com/office/drawing/2010/main">
+                <a:solidFill>
+                  <a:schemeClr val="accent1"/>
+                </a:solidFill>
+              </a14:hiddenFill>
+            </a:ext>
+            <a:ext uri="{91240B29-F687-4F45-9708-019B960494DF}">
+              <a14:hiddenLine xmlns:a14="http://schemas.microsoft.com/office/drawing/2010/main" w="9525">
+                <a:solidFill>
+                  <a:schemeClr val="tx1"/>
+                </a:solidFill>
+                <a:miter lim="800000"/>
+                <a:headEnd/>
+                <a:tailEnd/>
+              </a14:hiddenLine>
+            </a:ext>
+          </a:extLst>
+        </p:spPr>
+      </p:pic>
+    </p:spTree>
+    <p:extLst>
+      <p:ext uri="{BB962C8B-B14F-4D97-AF65-F5344CB8AC3E}">
+        <p14:creationId xmlns:p14="http://schemas.microsoft.com/office/powerpoint/2010/main" val="195265972"/>
+      </p:ext>
+    </p:extLst>
+  </p:cSld>
+  <p:clrMapOvr>
+    <a:masterClrMapping/>
+  </p:clrMapOvr>
+  <p:timing>
+    <p:tnLst>
+      <p:par>
+        <p:cTn id="1" dur="indefinite" restart="never" nodeType="tmRoot"/>
+      </p:par>
+    </p:tnLst>
+  </p:timing>
+</p:sld>
+</file>
+
+<file path=ppt/slides/slide20.xml><?xml version="1.0" encoding="utf-8"?>
 <p:sld xmlns:a="http://schemas.openxmlformats.org/drawingml/2006/main" xmlns:r="http://schemas.openxmlformats.org/officeDocument/2006/relationships" xmlns:p="http://schemas.openxmlformats.org/presentationml/2006/main">
   <p:cSld>
     <p:spTree>
@@ -7609,7 +7896,7 @@
 </p:sld>
 </file>
 
-<file path=ppt/slides/slide2.xml><?xml version="1.0" encoding="utf-8"?>
+<file path=ppt/slides/slide3.xml><?xml version="1.0" encoding="utf-8"?>
 <p:sld xmlns:a="http://schemas.openxmlformats.org/drawingml/2006/main" xmlns:r="http://schemas.openxmlformats.org/officeDocument/2006/relationships" xmlns:p="http://schemas.openxmlformats.org/presentationml/2006/main">
   <p:cSld>
     <p:spTree>
@@ -7650,7 +7937,7 @@
           <a:p>
             <a:r>
               <a:rPr lang="en-US" dirty="0" smtClean="0"/>
-              <a:t>Class Model/EDMX</a:t>
+              <a:t>Home Controller</a:t>
             </a:r>
             <a:endParaRPr lang="en-US" dirty="0"/>
           </a:p>
@@ -7658,7 +7945,7 @@
       </p:sp>
       <p:pic>
         <p:nvPicPr>
-          <p:cNvPr id="8194" name="Picture 2"/>
+          <p:cNvPr id="1026" name="Picture 2"/>
           <p:cNvPicPr>
             <a:picLocks noChangeAspect="1" noChangeArrowheads="1"/>
           </p:cNvPicPr>
@@ -7679,8 +7966,8 @@
         </p:blipFill>
         <p:spPr bwMode="auto">
           <a:xfrm>
-            <a:off x="-19907" y="938212"/>
-            <a:ext cx="9160278" cy="5310188"/>
+            <a:off x="1790700" y="1266825"/>
+            <a:ext cx="5562600" cy="4905375"/>
           </a:xfrm>
           <a:prstGeom prst="rect">
             <a:avLst/>
@@ -7713,7 +8000,7 @@
     </p:spTree>
     <p:extLst>
       <p:ext uri="{BB962C8B-B14F-4D97-AF65-F5344CB8AC3E}">
-        <p14:creationId xmlns:p14="http://schemas.microsoft.com/office/powerpoint/2010/main" val="195265972"/>
+        <p14:creationId xmlns:p14="http://schemas.microsoft.com/office/powerpoint/2010/main" val="4265454344"/>
       </p:ext>
     </p:extLst>
   </p:cSld>
@@ -7730,7 +8017,128 @@
 </p:sld>
 </file>
 
-<file path=ppt/slides/slide3.xml><?xml version="1.0" encoding="utf-8"?>
+<file path=ppt/slides/slide4.xml><?xml version="1.0" encoding="utf-8"?>
+<p:sld xmlns:a="http://schemas.openxmlformats.org/drawingml/2006/main" xmlns:r="http://schemas.openxmlformats.org/officeDocument/2006/relationships" xmlns:p="http://schemas.openxmlformats.org/presentationml/2006/main">
+  <p:cSld>
+    <p:spTree>
+      <p:nvGrpSpPr>
+        <p:cNvPr id="1" name=""/>
+        <p:cNvGrpSpPr/>
+        <p:nvPr/>
+      </p:nvGrpSpPr>
+      <p:grpSpPr>
+        <a:xfrm>
+          <a:off x="0" y="0"/>
+          <a:ext cx="0" cy="0"/>
+          <a:chOff x="0" y="0"/>
+          <a:chExt cx="0" cy="0"/>
+        </a:xfrm>
+      </p:grpSpPr>
+      <p:sp>
+        <p:nvSpPr>
+          <p:cNvPr id="5" name="Title 1"/>
+          <p:cNvSpPr>
+            <a:spLocks noGrp="1"/>
+          </p:cNvSpPr>
+          <p:nvPr>
+            <p:ph type="title"/>
+          </p:nvPr>
+        </p:nvSpPr>
+        <p:spPr>
+          <a:xfrm>
+            <a:off x="457200" y="228600"/>
+            <a:ext cx="8229600" cy="609600"/>
+          </a:xfrm>
+        </p:spPr>
+        <p:txBody>
+          <a:bodyPr>
+            <a:normAutofit fontScale="90000"/>
+          </a:bodyPr>
+          <a:lstStyle/>
+          <a:p>
+            <a:r>
+              <a:rPr lang="en-US" dirty="0" smtClean="0"/>
+              <a:t>Index View</a:t>
+            </a:r>
+            <a:endParaRPr lang="en-US" dirty="0"/>
+          </a:p>
+        </p:txBody>
+      </p:sp>
+      <p:pic>
+        <p:nvPicPr>
+          <p:cNvPr id="2050" name="Picture 2"/>
+          <p:cNvPicPr>
+            <a:picLocks noChangeAspect="1" noChangeArrowheads="1"/>
+          </p:cNvPicPr>
+          <p:nvPr/>
+        </p:nvPicPr>
+        <p:blipFill>
+          <a:blip r:embed="rId2">
+            <a:extLst>
+              <a:ext uri="{28A0092B-C50C-407E-A947-70E740481C1C}">
+                <a14:useLocalDpi xmlns:a14="http://schemas.microsoft.com/office/drawing/2010/main" val="0"/>
+              </a:ext>
+            </a:extLst>
+          </a:blip>
+          <a:srcRect/>
+          <a:stretch>
+            <a:fillRect/>
+          </a:stretch>
+        </p:blipFill>
+        <p:spPr bwMode="auto">
+          <a:xfrm>
+            <a:off x="533400" y="912939"/>
+            <a:ext cx="8305800" cy="5335461"/>
+          </a:xfrm>
+          <a:prstGeom prst="rect">
+            <a:avLst/>
+          </a:prstGeom>
+          <a:noFill/>
+          <a:ln>
+            <a:noFill/>
+          </a:ln>
+          <a:extLst>
+            <a:ext uri="{909E8E84-426E-40DD-AFC4-6F175D3DCCD1}">
+              <a14:hiddenFill xmlns:a14="http://schemas.microsoft.com/office/drawing/2010/main">
+                <a:solidFill>
+                  <a:schemeClr val="accent1"/>
+                </a:solidFill>
+              </a14:hiddenFill>
+            </a:ext>
+            <a:ext uri="{91240B29-F687-4F45-9708-019B960494DF}">
+              <a14:hiddenLine xmlns:a14="http://schemas.microsoft.com/office/drawing/2010/main" w="9525">
+                <a:solidFill>
+                  <a:schemeClr val="tx1"/>
+                </a:solidFill>
+                <a:miter lim="800000"/>
+                <a:headEnd/>
+                <a:tailEnd/>
+              </a14:hiddenLine>
+            </a:ext>
+          </a:extLst>
+        </p:spPr>
+      </p:pic>
+    </p:spTree>
+    <p:extLst>
+      <p:ext uri="{BB962C8B-B14F-4D97-AF65-F5344CB8AC3E}">
+        <p14:creationId xmlns:p14="http://schemas.microsoft.com/office/powerpoint/2010/main" val="3326190659"/>
+      </p:ext>
+    </p:extLst>
+  </p:cSld>
+  <p:clrMapOvr>
+    <a:masterClrMapping/>
+  </p:clrMapOvr>
+  <p:timing>
+    <p:tnLst>
+      <p:par>
+        <p:cTn id="1" dur="indefinite" restart="never" nodeType="tmRoot"/>
+      </p:par>
+    </p:tnLst>
+  </p:timing>
+</p:sld>
+</file>
+
+<file path=ppt/slides/slide5.xml><?xml version="1.0" encoding="utf-8"?>
 <p:sld xmlns:a="http://schemas.openxmlformats.org/drawingml/2006/main" xmlns:r="http://schemas.openxmlformats.org/officeDocument/2006/relationships" xmlns:p="http://schemas.openxmlformats.org/presentationml/2006/main">
   <p:cSld>
     <p:spTree>
@@ -7790,7 +8198,7 @@
 </p:sld>
 </file>
 
-<file path=ppt/slides/slide4.xml><?xml version="1.0" encoding="utf-8"?>
+<file path=ppt/slides/slide6.xml><?xml version="1.0" encoding="utf-8"?>
 <p:sld xmlns:a="http://schemas.openxmlformats.org/drawingml/2006/main" xmlns:r="http://schemas.openxmlformats.org/officeDocument/2006/relationships" xmlns:p="http://schemas.openxmlformats.org/presentationml/2006/main">
   <p:cSld>
     <p:spTree>
@@ -7909,7 +8317,7 @@
 </p:sld>
 </file>
 
-<file path=ppt/slides/slide5.xml><?xml version="1.0" encoding="utf-8"?>
+<file path=ppt/slides/slide7.xml><?xml version="1.0" encoding="utf-8"?>
 <p:sld xmlns:a="http://schemas.openxmlformats.org/drawingml/2006/main" xmlns:r="http://schemas.openxmlformats.org/officeDocument/2006/relationships" xmlns:p="http://schemas.openxmlformats.org/presentationml/2006/main">
   <p:cSld>
     <p:spTree>
@@ -8029,7 +8437,7 @@
 </p:sld>
 </file>
 
-<file path=ppt/slides/slide6.xml><?xml version="1.0" encoding="utf-8"?>
+<file path=ppt/slides/slide8.xml><?xml version="1.0" encoding="utf-8"?>
 <p:sld xmlns:a="http://schemas.openxmlformats.org/drawingml/2006/main" xmlns:r="http://schemas.openxmlformats.org/officeDocument/2006/relationships" xmlns:p="http://schemas.openxmlformats.org/presentationml/2006/main">
   <p:cSld>
     <p:spTree>
@@ -8152,7 +8560,7 @@
 </p:sld>
 </file>
 
-<file path=ppt/slides/slide7.xml><?xml version="1.0" encoding="utf-8"?>
+<file path=ppt/slides/slide9.xml><?xml version="1.0" encoding="utf-8"?>
 <p:sld xmlns:a="http://schemas.openxmlformats.org/drawingml/2006/main" xmlns:r="http://schemas.openxmlformats.org/officeDocument/2006/relationships" xmlns:p="http://schemas.openxmlformats.org/presentationml/2006/main">
   <p:cSld>
     <p:spTree>
@@ -8311,187 +8719,6 @@
     <p:extLst>
       <p:ext uri="{BB962C8B-B14F-4D97-AF65-F5344CB8AC3E}">
         <p14:creationId xmlns:p14="http://schemas.microsoft.com/office/powerpoint/2010/main" val="1655712591"/>
-      </p:ext>
-    </p:extLst>
-  </p:cSld>
-  <p:clrMapOvr>
-    <a:masterClrMapping/>
-  </p:clrMapOvr>
-  <p:timing>
-    <p:tnLst>
-      <p:par>
-        <p:cTn id="1" dur="indefinite" restart="never" nodeType="tmRoot"/>
-      </p:par>
-    </p:tnLst>
-  </p:timing>
-</p:sld>
-</file>
-
-<file path=ppt/slides/slide8.xml><?xml version="1.0" encoding="utf-8"?>
-<p:sld xmlns:a="http://schemas.openxmlformats.org/drawingml/2006/main" xmlns:r="http://schemas.openxmlformats.org/officeDocument/2006/relationships" xmlns:p="http://schemas.openxmlformats.org/presentationml/2006/main">
-  <p:cSld>
-    <p:spTree>
-      <p:nvGrpSpPr>
-        <p:cNvPr id="1" name=""/>
-        <p:cNvGrpSpPr/>
-        <p:nvPr/>
-      </p:nvGrpSpPr>
-      <p:grpSpPr>
-        <a:xfrm>
-          <a:off x="0" y="0"/>
-          <a:ext cx="0" cy="0"/>
-          <a:chOff x="0" y="0"/>
-          <a:chExt cx="0" cy="0"/>
-        </a:xfrm>
-      </p:grpSpPr>
-      <p:sp>
-        <p:nvSpPr>
-          <p:cNvPr id="4" name="Title 3"/>
-          <p:cNvSpPr>
-            <a:spLocks noGrp="1"/>
-          </p:cNvSpPr>
-          <p:nvPr>
-            <p:ph type="ctrTitle"/>
-          </p:nvPr>
-        </p:nvSpPr>
-        <p:spPr/>
-        <p:txBody>
-          <a:bodyPr/>
-          <a:lstStyle/>
-          <a:p>
-            <a:r>
-              <a:rPr lang="en-US" dirty="0" smtClean="0"/>
-              <a:t>Edit</a:t>
-            </a:r>
-            <a:endParaRPr lang="en-US" dirty="0"/>
-          </a:p>
-        </p:txBody>
-      </p:sp>
-    </p:spTree>
-    <p:extLst>
-      <p:ext uri="{BB962C8B-B14F-4D97-AF65-F5344CB8AC3E}">
-        <p14:creationId xmlns:p14="http://schemas.microsoft.com/office/powerpoint/2010/main" val="238809020"/>
-      </p:ext>
-    </p:extLst>
-  </p:cSld>
-  <p:clrMapOvr>
-    <a:masterClrMapping/>
-  </p:clrMapOvr>
-  <p:timing>
-    <p:tnLst>
-      <p:par>
-        <p:cTn id="1" dur="indefinite" restart="never" nodeType="tmRoot"/>
-      </p:par>
-    </p:tnLst>
-  </p:timing>
-</p:sld>
-</file>
-
-<file path=ppt/slides/slide9.xml><?xml version="1.0" encoding="utf-8"?>
-<p:sld xmlns:a="http://schemas.openxmlformats.org/drawingml/2006/main" xmlns:r="http://schemas.openxmlformats.org/officeDocument/2006/relationships" xmlns:p="http://schemas.openxmlformats.org/presentationml/2006/main">
-  <p:cSld>
-    <p:spTree>
-      <p:nvGrpSpPr>
-        <p:cNvPr id="1" name=""/>
-        <p:cNvGrpSpPr/>
-        <p:nvPr/>
-      </p:nvGrpSpPr>
-      <p:grpSpPr>
-        <a:xfrm>
-          <a:off x="0" y="0"/>
-          <a:ext cx="0" cy="0"/>
-          <a:chOff x="0" y="0"/>
-          <a:chExt cx="0" cy="0"/>
-        </a:xfrm>
-      </p:grpSpPr>
-      <p:sp>
-        <p:nvSpPr>
-          <p:cNvPr id="5" name="Title 1"/>
-          <p:cNvSpPr>
-            <a:spLocks noGrp="1"/>
-          </p:cNvSpPr>
-          <p:nvPr>
-            <p:ph type="title"/>
-          </p:nvPr>
-        </p:nvSpPr>
-        <p:spPr>
-          <a:xfrm>
-            <a:off x="457200" y="228600"/>
-            <a:ext cx="8229600" cy="609600"/>
-          </a:xfrm>
-        </p:spPr>
-        <p:txBody>
-          <a:bodyPr>
-            <a:normAutofit fontScale="90000"/>
-          </a:bodyPr>
-          <a:lstStyle/>
-          <a:p>
-            <a:r>
-              <a:rPr lang="en-US" dirty="0" smtClean="0"/>
-              <a:t>Controller</a:t>
-            </a:r>
-            <a:endParaRPr lang="en-US" dirty="0"/>
-          </a:p>
-        </p:txBody>
-      </p:sp>
-      <p:pic>
-        <p:nvPicPr>
-          <p:cNvPr id="2051" name="Picture 3"/>
-          <p:cNvPicPr>
-            <a:picLocks noChangeAspect="1" noChangeArrowheads="1"/>
-          </p:cNvPicPr>
-          <p:nvPr/>
-        </p:nvPicPr>
-        <p:blipFill>
-          <a:blip r:embed="rId2">
-            <a:extLst>
-              <a:ext uri="{28A0092B-C50C-407E-A947-70E740481C1C}">
-                <a14:useLocalDpi xmlns:a14="http://schemas.microsoft.com/office/drawing/2010/main" val="0"/>
-              </a:ext>
-            </a:extLst>
-          </a:blip>
-          <a:srcRect/>
-          <a:stretch>
-            <a:fillRect/>
-          </a:stretch>
-        </p:blipFill>
-        <p:spPr bwMode="auto">
-          <a:xfrm>
-            <a:off x="1857375" y="847725"/>
-            <a:ext cx="5429250" cy="5934075"/>
-          </a:xfrm>
-          <a:prstGeom prst="rect">
-            <a:avLst/>
-          </a:prstGeom>
-          <a:noFill/>
-          <a:ln>
-            <a:noFill/>
-          </a:ln>
-          <a:extLst>
-            <a:ext uri="{909E8E84-426E-40DD-AFC4-6F175D3DCCD1}">
-              <a14:hiddenFill xmlns:a14="http://schemas.microsoft.com/office/drawing/2010/main">
-                <a:solidFill>
-                  <a:schemeClr val="accent1"/>
-                </a:solidFill>
-              </a14:hiddenFill>
-            </a:ext>
-            <a:ext uri="{91240B29-F687-4F45-9708-019B960494DF}">
-              <a14:hiddenLine xmlns:a14="http://schemas.microsoft.com/office/drawing/2010/main" w="9525">
-                <a:solidFill>
-                  <a:schemeClr val="tx1"/>
-                </a:solidFill>
-                <a:miter lim="800000"/>
-                <a:headEnd/>
-                <a:tailEnd/>
-              </a14:hiddenLine>
-            </a:ext>
-          </a:extLst>
-        </p:spPr>
-      </p:pic>
-    </p:spTree>
-    <p:extLst>
-      <p:ext uri="{BB962C8B-B14F-4D97-AF65-F5344CB8AC3E}">
-        <p14:creationId xmlns:p14="http://schemas.microsoft.com/office/powerpoint/2010/main" val="2170860700"/>
       </p:ext>
     </p:extLst>
   </p:cSld>

</xml_diff>

<commit_message>
updated my powerpoint slides
</commit_message>
<xml_diff>
--- a/3610 Presentation.pptx
+++ b/3610 Presentation.pptx
@@ -129,7 +129,7 @@
   </p:defaultTextStyle>
   <p:extLst>
     <p:ext uri="{EFAFB233-063F-42B5-8137-9DF3F51BA10A}">
-      <p15:sldGuideLst xmlns:p15="http://schemas.microsoft.com/office/powerpoint/2012/main" xmlns="">
+      <p15:sldGuideLst xmlns:p15="http://schemas.microsoft.com/office/powerpoint/2012/main">
         <p15:guide id="1" orient="horz" pos="2160">
           <p15:clr>
             <a:srgbClr val="A4A3A4"/>
@@ -7191,14 +7191,30 @@
           <a:p>
             <a:r>
               <a:rPr lang="en-US" dirty="0" smtClean="0"/>
-              <a:t>Uses simple common syntax (LINQ) to Add/Modify/Delete/Update objects. </a:t>
+              <a:t>Uses simple common syntax (LINQ) to </a:t>
+            </a:r>
+            <a:r>
+              <a:rPr lang="en-US" dirty="0" smtClean="0"/>
+              <a:t>Add/Read/Delete/Update </a:t>
+            </a:r>
+            <a:r>
+              <a:rPr lang="en-US" dirty="0" smtClean="0"/>
+              <a:t>objects. </a:t>
             </a:r>
           </a:p>
           <a:p>
             <a:pPr lvl="1"/>
             <a:r>
               <a:rPr lang="en-US" dirty="0" smtClean="0"/>
-              <a:t>No need to deal with writing SQL</a:t>
+              <a:t>No need to deal with </a:t>
+            </a:r>
+            <a:r>
+              <a:rPr lang="en-US" smtClean="0"/>
+              <a:t>writing much </a:t>
+            </a:r>
+            <a:r>
+              <a:rPr lang="en-US" dirty="0" smtClean="0"/>
+              <a:t>SQL</a:t>
             </a:r>
           </a:p>
           <a:p>

</xml_diff>

<commit_message>
updated slides CRUD before ajax etc
</commit_message>
<xml_diff>
--- a/3610 Presentation.pptx
+++ b/3610 Presentation.pptx
@@ -13,21 +13,21 @@
     <p:sldId id="267" r:id="rId4"/>
     <p:sldId id="276" r:id="rId5"/>
     <p:sldId id="277" r:id="rId6"/>
-    <p:sldId id="258" r:id="rId7"/>
-    <p:sldId id="260" r:id="rId8"/>
-    <p:sldId id="257" r:id="rId9"/>
-    <p:sldId id="259" r:id="rId10"/>
-    <p:sldId id="262" r:id="rId11"/>
-    <p:sldId id="264" r:id="rId12"/>
-    <p:sldId id="263" r:id="rId13"/>
-    <p:sldId id="265" r:id="rId14"/>
-    <p:sldId id="266" r:id="rId15"/>
-    <p:sldId id="275" r:id="rId16"/>
-    <p:sldId id="270" r:id="rId17"/>
-    <p:sldId id="271" r:id="rId18"/>
-    <p:sldId id="272" r:id="rId19"/>
-    <p:sldId id="273" r:id="rId20"/>
-    <p:sldId id="274" r:id="rId21"/>
+    <p:sldId id="278" r:id="rId7"/>
+    <p:sldId id="279" r:id="rId8"/>
+    <p:sldId id="280" r:id="rId9"/>
+    <p:sldId id="281" r:id="rId10"/>
+    <p:sldId id="282" r:id="rId11"/>
+    <p:sldId id="283" r:id="rId12"/>
+    <p:sldId id="258" r:id="rId13"/>
+    <p:sldId id="260" r:id="rId14"/>
+    <p:sldId id="257" r:id="rId15"/>
+    <p:sldId id="259" r:id="rId16"/>
+    <p:sldId id="262" r:id="rId17"/>
+    <p:sldId id="264" r:id="rId18"/>
+    <p:sldId id="263" r:id="rId19"/>
+    <p:sldId id="265" r:id="rId20"/>
+    <p:sldId id="266" r:id="rId21"/>
     <p:sldId id="269" r:id="rId22"/>
   </p:sldIdLst>
   <p:sldSz cx="9144000" cy="6858000" type="screen4x3"/>
@@ -228,7 +228,7 @@
           <a:p>
             <a:fld id="{45F41EA3-EFF2-474B-A924-F6FCCE16B7CE}" type="datetimeFigureOut">
               <a:rPr lang="en-US" smtClean="0"/>
-              <a:t>4/26/2015</a:t>
+              <a:t>4/27/2015</a:t>
             </a:fld>
             <a:endParaRPr lang="en-US"/>
           </a:p>
@@ -561,7 +561,7 @@
           <a:p>
             <a:fld id="{20A4151E-10FD-415C-8555-A491F065CF6B}" type="slidenum">
               <a:rPr lang="en-US" smtClean="0"/>
-              <a:t>12</a:t>
+              <a:t>18</a:t>
             </a:fld>
             <a:endParaRPr lang="en-US"/>
           </a:p>
@@ -767,7 +767,7 @@
           <a:p>
             <a:fld id="{1EFB939A-613A-477C-936C-59751EDD593B}" type="datetimeFigureOut">
               <a:rPr lang="en-US" smtClean="0"/>
-              <a:t>4/26/2015</a:t>
+              <a:t>4/27/2015</a:t>
             </a:fld>
             <a:endParaRPr lang="en-US"/>
           </a:p>
@@ -932,7 +932,7 @@
           <a:p>
             <a:fld id="{1EFB939A-613A-477C-936C-59751EDD593B}" type="datetimeFigureOut">
               <a:rPr lang="en-US" smtClean="0"/>
-              <a:t>4/26/2015</a:t>
+              <a:t>4/27/2015</a:t>
             </a:fld>
             <a:endParaRPr lang="en-US"/>
           </a:p>
@@ -1107,7 +1107,7 @@
           <a:p>
             <a:fld id="{1EFB939A-613A-477C-936C-59751EDD593B}" type="datetimeFigureOut">
               <a:rPr lang="en-US" smtClean="0"/>
-              <a:t>4/26/2015</a:t>
+              <a:t>4/27/2015</a:t>
             </a:fld>
             <a:endParaRPr lang="en-US"/>
           </a:p>
@@ -1344,7 +1344,7 @@
           <a:p>
             <a:fld id="{1EFB939A-613A-477C-936C-59751EDD593B}" type="datetimeFigureOut">
               <a:rPr lang="en-US" smtClean="0"/>
-              <a:t>4/26/2015</a:t>
+              <a:t>4/27/2015</a:t>
             </a:fld>
             <a:endParaRPr lang="en-US"/>
           </a:p>
@@ -1514,7 +1514,7 @@
           <a:p>
             <a:fld id="{1EFB939A-613A-477C-936C-59751EDD593B}" type="datetimeFigureOut">
               <a:rPr lang="en-US" smtClean="0"/>
-              <a:t>4/26/2015</a:t>
+              <a:t>4/27/2015</a:t>
             </a:fld>
             <a:endParaRPr lang="en-US"/>
           </a:p>
@@ -1760,7 +1760,7 @@
           <a:p>
             <a:fld id="{1EFB939A-613A-477C-936C-59751EDD593B}" type="datetimeFigureOut">
               <a:rPr lang="en-US" smtClean="0"/>
-              <a:t>4/26/2015</a:t>
+              <a:t>4/27/2015</a:t>
             </a:fld>
             <a:endParaRPr lang="en-US"/>
           </a:p>
@@ -2048,7 +2048,7 @@
           <a:p>
             <a:fld id="{1EFB939A-613A-477C-936C-59751EDD593B}" type="datetimeFigureOut">
               <a:rPr lang="en-US" smtClean="0"/>
-              <a:t>4/26/2015</a:t>
+              <a:t>4/27/2015</a:t>
             </a:fld>
             <a:endParaRPr lang="en-US"/>
           </a:p>
@@ -2470,7 +2470,7 @@
           <a:p>
             <a:fld id="{1EFB939A-613A-477C-936C-59751EDD593B}" type="datetimeFigureOut">
               <a:rPr lang="en-US" smtClean="0"/>
-              <a:t>4/26/2015</a:t>
+              <a:t>4/27/2015</a:t>
             </a:fld>
             <a:endParaRPr lang="en-US"/>
           </a:p>
@@ -2588,7 +2588,7 @@
           <a:p>
             <a:fld id="{1EFB939A-613A-477C-936C-59751EDD593B}" type="datetimeFigureOut">
               <a:rPr lang="en-US" smtClean="0"/>
-              <a:t>4/26/2015</a:t>
+              <a:t>4/27/2015</a:t>
             </a:fld>
             <a:endParaRPr lang="en-US"/>
           </a:p>
@@ -2683,7 +2683,7 @@
           <a:p>
             <a:fld id="{1EFB939A-613A-477C-936C-59751EDD593B}" type="datetimeFigureOut">
               <a:rPr lang="en-US" smtClean="0"/>
-              <a:t>4/26/2015</a:t>
+              <a:t>4/27/2015</a:t>
             </a:fld>
             <a:endParaRPr lang="en-US"/>
           </a:p>
@@ -2960,7 +2960,7 @@
           <a:p>
             <a:fld id="{1EFB939A-613A-477C-936C-59751EDD593B}" type="datetimeFigureOut">
               <a:rPr lang="en-US" smtClean="0"/>
-              <a:t>4/26/2015</a:t>
+              <a:t>4/27/2015</a:t>
             </a:fld>
             <a:endParaRPr lang="en-US"/>
           </a:p>
@@ -3130,7 +3130,7 @@
           <a:p>
             <a:fld id="{1EFB939A-613A-477C-936C-59751EDD593B}" type="datetimeFigureOut">
               <a:rPr lang="en-US" smtClean="0"/>
-              <a:t>4/26/2015</a:t>
+              <a:t>4/27/2015</a:t>
             </a:fld>
             <a:endParaRPr lang="en-US"/>
           </a:p>
@@ -3378,7 +3378,7 @@
           <a:p>
             <a:fld id="{1EFB939A-613A-477C-936C-59751EDD593B}" type="datetimeFigureOut">
               <a:rPr lang="en-US" smtClean="0"/>
-              <a:t>4/26/2015</a:t>
+              <a:t>4/27/2015</a:t>
             </a:fld>
             <a:endParaRPr lang="en-US"/>
           </a:p>
@@ -3548,7 +3548,7 @@
           <a:p>
             <a:fld id="{1EFB939A-613A-477C-936C-59751EDD593B}" type="datetimeFigureOut">
               <a:rPr lang="en-US" smtClean="0"/>
-              <a:t>4/26/2015</a:t>
+              <a:t>4/27/2015</a:t>
             </a:fld>
             <a:endParaRPr lang="en-US"/>
           </a:p>
@@ -3728,7 +3728,7 @@
           <a:p>
             <a:fld id="{1EFB939A-613A-477C-936C-59751EDD593B}" type="datetimeFigureOut">
               <a:rPr lang="en-US" smtClean="0"/>
-              <a:t>4/26/2015</a:t>
+              <a:t>4/27/2015</a:t>
             </a:fld>
             <a:endParaRPr lang="en-US"/>
           </a:p>
@@ -3972,7 +3972,7 @@
           <a:p>
             <a:fld id="{1EFB939A-613A-477C-936C-59751EDD593B}" type="datetimeFigureOut">
               <a:rPr lang="en-US" smtClean="0"/>
-              <a:t>4/26/2015</a:t>
+              <a:t>4/27/2015</a:t>
             </a:fld>
             <a:endParaRPr lang="en-US"/>
           </a:p>
@@ -4062,7 +4062,7 @@
           <a:p>
             <a:fld id="{1EFB939A-613A-477C-936C-59751EDD593B}" type="datetimeFigureOut">
               <a:rPr lang="en-US" smtClean="0"/>
-              <a:t>4/26/2015</a:t>
+              <a:t>4/27/2015</a:t>
             </a:fld>
             <a:endParaRPr lang="en-US"/>
           </a:p>
@@ -4436,7 +4436,7 @@
           <a:p>
             <a:fld id="{1EFB939A-613A-477C-936C-59751EDD593B}" type="datetimeFigureOut">
               <a:rPr lang="en-US" smtClean="0"/>
-              <a:t>4/26/2015</a:t>
+              <a:t>4/27/2015</a:t>
             </a:fld>
             <a:endParaRPr lang="en-US"/>
           </a:p>
@@ -4691,7 +4691,7 @@
           <a:p>
             <a:fld id="{1EFB939A-613A-477C-936C-59751EDD593B}" type="datetimeFigureOut">
               <a:rPr lang="en-US" smtClean="0"/>
-              <a:t>4/26/2015</a:t>
+              <a:t>4/27/2015</a:t>
             </a:fld>
             <a:endParaRPr lang="en-US"/>
           </a:p>
@@ -4781,7 +4781,7 @@
           <a:p>
             <a:fld id="{1EFB939A-613A-477C-936C-59751EDD593B}" type="datetimeFigureOut">
               <a:rPr lang="en-US" smtClean="0"/>
-              <a:t>4/26/2015</a:t>
+              <a:t>4/27/2015</a:t>
             </a:fld>
             <a:endParaRPr lang="en-US"/>
           </a:p>
@@ -5055,7 +5055,7 @@
           <a:p>
             <a:fld id="{1EFB939A-613A-477C-936C-59751EDD593B}" type="datetimeFigureOut">
               <a:rPr lang="en-US" smtClean="0"/>
-              <a:t>4/26/2015</a:t>
+              <a:t>4/27/2015</a:t>
             </a:fld>
             <a:endParaRPr lang="en-US"/>
           </a:p>
@@ -5327,7 +5327,7 @@
           <a:p>
             <a:fld id="{1EFB939A-613A-477C-936C-59751EDD593B}" type="datetimeFigureOut">
               <a:rPr lang="en-US" smtClean="0"/>
-              <a:t>4/26/2015</a:t>
+              <a:t>4/27/2015</a:t>
             </a:fld>
             <a:endParaRPr lang="en-US"/>
           </a:p>
@@ -5627,7 +5627,7 @@
           <a:p>
             <a:fld id="{1EFB939A-613A-477C-936C-59751EDD593B}" type="datetimeFigureOut">
               <a:rPr lang="en-US" smtClean="0"/>
-              <a:t>4/26/2015</a:t>
+              <a:t>4/27/2015</a:t>
             </a:fld>
             <a:endParaRPr lang="en-US"/>
           </a:p>
@@ -6211,7 +6211,7 @@
           <a:p>
             <a:fld id="{1EFB939A-613A-477C-936C-59751EDD593B}" type="datetimeFigureOut">
               <a:rPr lang="en-US" smtClean="0"/>
-              <a:t>4/26/2015</a:t>
+              <a:t>4/27/2015</a:t>
             </a:fld>
             <a:endParaRPr lang="en-US"/>
           </a:p>
@@ -6670,6 +6670,689 @@
       </p:grpSpPr>
       <p:sp>
         <p:nvSpPr>
+          <p:cNvPr id="2" name="Title 1"/>
+          <p:cNvSpPr>
+            <a:spLocks noGrp="1"/>
+          </p:cNvSpPr>
+          <p:nvPr>
+            <p:ph type="title"/>
+          </p:nvPr>
+        </p:nvSpPr>
+        <p:spPr/>
+        <p:txBody>
+          <a:bodyPr>
+            <a:normAutofit/>
+          </a:bodyPr>
+          <a:lstStyle/>
+          <a:p>
+            <a:r>
+              <a:rPr lang="en-US" dirty="0" smtClean="0"/>
+              <a:t>Asset Models – Edit View</a:t>
+            </a:r>
+            <a:endParaRPr lang="en-US" dirty="0"/>
+          </a:p>
+        </p:txBody>
+      </p:sp>
+      <p:pic>
+        <p:nvPicPr>
+          <p:cNvPr id="4" name="Picture 3"/>
+          <p:cNvPicPr>
+            <a:picLocks noChangeAspect="1"/>
+          </p:cNvPicPr>
+          <p:nvPr/>
+        </p:nvPicPr>
+        <p:blipFill>
+          <a:blip r:embed="rId2"/>
+          <a:stretch>
+            <a:fillRect/>
+          </a:stretch>
+        </p:blipFill>
+        <p:spPr>
+          <a:xfrm>
+            <a:off x="152400" y="1828800"/>
+            <a:ext cx="9601200" cy="3581400"/>
+          </a:xfrm>
+          <a:prstGeom prst="rect">
+            <a:avLst/>
+          </a:prstGeom>
+        </p:spPr>
+      </p:pic>
+    </p:spTree>
+    <p:extLst>
+      <p:ext uri="{BB962C8B-B14F-4D97-AF65-F5344CB8AC3E}">
+        <p14:creationId xmlns:p14="http://schemas.microsoft.com/office/powerpoint/2010/main" val="3010972550"/>
+      </p:ext>
+    </p:extLst>
+  </p:cSld>
+  <p:clrMapOvr>
+    <a:masterClrMapping/>
+  </p:clrMapOvr>
+  <p:timing>
+    <p:tnLst>
+      <p:par>
+        <p:cTn id="1" dur="indefinite" restart="never" nodeType="tmRoot"/>
+      </p:par>
+    </p:tnLst>
+  </p:timing>
+</p:sld>
+</file>
+
+<file path=ppt/slides/slide11.xml><?xml version="1.0" encoding="utf-8"?>
+<p:sld xmlns:a="http://schemas.openxmlformats.org/drawingml/2006/main" xmlns:r="http://schemas.openxmlformats.org/officeDocument/2006/relationships" xmlns:p="http://schemas.openxmlformats.org/presentationml/2006/main">
+  <p:cSld>
+    <p:spTree>
+      <p:nvGrpSpPr>
+        <p:cNvPr id="1" name=""/>
+        <p:cNvGrpSpPr/>
+        <p:nvPr/>
+      </p:nvGrpSpPr>
+      <p:grpSpPr>
+        <a:xfrm>
+          <a:off x="0" y="0"/>
+          <a:ext cx="0" cy="0"/>
+          <a:chOff x="0" y="0"/>
+          <a:chExt cx="0" cy="0"/>
+        </a:xfrm>
+      </p:grpSpPr>
+      <p:sp>
+        <p:nvSpPr>
+          <p:cNvPr id="2" name="Title 1"/>
+          <p:cNvSpPr>
+            <a:spLocks noGrp="1"/>
+          </p:cNvSpPr>
+          <p:nvPr>
+            <p:ph type="ctrTitle"/>
+          </p:nvPr>
+        </p:nvSpPr>
+        <p:spPr/>
+        <p:txBody>
+          <a:bodyPr/>
+          <a:lstStyle/>
+          <a:p>
+            <a:r>
+              <a:rPr lang="en-US" dirty="0" smtClean="0"/>
+              <a:t>Asset Search</a:t>
+            </a:r>
+            <a:endParaRPr lang="en-US" dirty="0"/>
+          </a:p>
+        </p:txBody>
+      </p:sp>
+    </p:spTree>
+    <p:extLst>
+      <p:ext uri="{BB962C8B-B14F-4D97-AF65-F5344CB8AC3E}">
+        <p14:creationId xmlns:p14="http://schemas.microsoft.com/office/powerpoint/2010/main" val="4280261589"/>
+      </p:ext>
+    </p:extLst>
+  </p:cSld>
+  <p:clrMapOvr>
+    <a:masterClrMapping/>
+  </p:clrMapOvr>
+  <p:timing>
+    <p:tnLst>
+      <p:par>
+        <p:cTn id="1" dur="indefinite" restart="never" nodeType="tmRoot"/>
+      </p:par>
+    </p:tnLst>
+  </p:timing>
+</p:sld>
+</file>
+
+<file path=ppt/slides/slide12.xml><?xml version="1.0" encoding="utf-8"?>
+<p:sld xmlns:a="http://schemas.openxmlformats.org/drawingml/2006/main" xmlns:r="http://schemas.openxmlformats.org/officeDocument/2006/relationships" xmlns:p="http://schemas.openxmlformats.org/presentationml/2006/main">
+  <p:cSld>
+    <p:spTree>
+      <p:nvGrpSpPr>
+        <p:cNvPr id="1" name=""/>
+        <p:cNvGrpSpPr/>
+        <p:nvPr/>
+      </p:nvGrpSpPr>
+      <p:grpSpPr>
+        <a:xfrm>
+          <a:off x="0" y="0"/>
+          <a:ext cx="0" cy="0"/>
+          <a:chOff x="0" y="0"/>
+          <a:chExt cx="0" cy="0"/>
+        </a:xfrm>
+      </p:grpSpPr>
+      <p:sp>
+        <p:nvSpPr>
+          <p:cNvPr id="5" name="Title 1"/>
+          <p:cNvSpPr>
+            <a:spLocks noGrp="1"/>
+          </p:cNvSpPr>
+          <p:nvPr>
+            <p:ph type="title"/>
+          </p:nvPr>
+        </p:nvSpPr>
+        <p:spPr>
+          <a:xfrm>
+            <a:off x="533400" y="228600"/>
+            <a:ext cx="8229600" cy="1143000"/>
+          </a:xfrm>
+        </p:spPr>
+        <p:txBody>
+          <a:bodyPr/>
+          <a:lstStyle/>
+          <a:p>
+            <a:r>
+              <a:rPr lang="en-US" dirty="0" smtClean="0"/>
+              <a:t>Controller</a:t>
+            </a:r>
+            <a:endParaRPr lang="en-US" dirty="0"/>
+          </a:p>
+        </p:txBody>
+      </p:sp>
+      <p:pic>
+        <p:nvPicPr>
+          <p:cNvPr id="1027" name="Picture 3"/>
+          <p:cNvPicPr>
+            <a:picLocks noChangeAspect="1" noChangeArrowheads="1"/>
+          </p:cNvPicPr>
+          <p:nvPr/>
+        </p:nvPicPr>
+        <p:blipFill>
+          <a:blip r:embed="rId2">
+            <a:extLst>
+              <a:ext uri="{28A0092B-C50C-407E-A947-70E740481C1C}">
+                <a14:useLocalDpi xmlns:a14="http://schemas.microsoft.com/office/drawing/2010/main" val="0"/>
+              </a:ext>
+            </a:extLst>
+          </a:blip>
+          <a:srcRect/>
+          <a:stretch>
+            <a:fillRect/>
+          </a:stretch>
+        </p:blipFill>
+        <p:spPr bwMode="auto">
+          <a:xfrm>
+            <a:off x="166688" y="1585913"/>
+            <a:ext cx="8810625" cy="3686175"/>
+          </a:xfrm>
+          <a:prstGeom prst="rect">
+            <a:avLst/>
+          </a:prstGeom>
+          <a:noFill/>
+          <a:ln>
+            <a:noFill/>
+          </a:ln>
+          <a:extLst>
+            <a:ext uri="{909E8E84-426E-40DD-AFC4-6F175D3DCCD1}">
+              <a14:hiddenFill xmlns:a14="http://schemas.microsoft.com/office/drawing/2010/main">
+                <a:solidFill>
+                  <a:schemeClr val="accent1"/>
+                </a:solidFill>
+              </a14:hiddenFill>
+            </a:ext>
+            <a:ext uri="{91240B29-F687-4F45-9708-019B960494DF}">
+              <a14:hiddenLine xmlns:a14="http://schemas.microsoft.com/office/drawing/2010/main" w="9525">
+                <a:solidFill>
+                  <a:schemeClr val="tx1"/>
+                </a:solidFill>
+                <a:miter lim="800000"/>
+                <a:headEnd/>
+                <a:tailEnd/>
+              </a14:hiddenLine>
+            </a:ext>
+          </a:extLst>
+        </p:spPr>
+      </p:pic>
+    </p:spTree>
+    <p:extLst>
+      <p:ext uri="{BB962C8B-B14F-4D97-AF65-F5344CB8AC3E}">
+        <p14:creationId xmlns:p14="http://schemas.microsoft.com/office/powerpoint/2010/main" val="2020609014"/>
+      </p:ext>
+    </p:extLst>
+  </p:cSld>
+  <p:clrMapOvr>
+    <a:masterClrMapping/>
+  </p:clrMapOvr>
+  <p:timing>
+    <p:tnLst>
+      <p:par>
+        <p:cTn id="1" dur="indefinite" restart="never" nodeType="tmRoot"/>
+      </p:par>
+    </p:tnLst>
+  </p:timing>
+</p:sld>
+</file>
+
+<file path=ppt/slides/slide13.xml><?xml version="1.0" encoding="utf-8"?>
+<p:sld xmlns:a="http://schemas.openxmlformats.org/drawingml/2006/main" xmlns:r="http://schemas.openxmlformats.org/officeDocument/2006/relationships" xmlns:p="http://schemas.openxmlformats.org/presentationml/2006/main">
+  <p:cSld>
+    <p:spTree>
+      <p:nvGrpSpPr>
+        <p:cNvPr id="1" name=""/>
+        <p:cNvGrpSpPr/>
+        <p:nvPr/>
+      </p:nvGrpSpPr>
+      <p:grpSpPr>
+        <a:xfrm>
+          <a:off x="0" y="0"/>
+          <a:ext cx="0" cy="0"/>
+          <a:chOff x="0" y="0"/>
+          <a:chExt cx="0" cy="0"/>
+        </a:xfrm>
+      </p:grpSpPr>
+      <p:sp>
+        <p:nvSpPr>
+          <p:cNvPr id="2" name="Title 1"/>
+          <p:cNvSpPr>
+            <a:spLocks noGrp="1"/>
+          </p:cNvSpPr>
+          <p:nvPr>
+            <p:ph type="title"/>
+          </p:nvPr>
+        </p:nvSpPr>
+        <p:spPr>
+          <a:xfrm>
+            <a:off x="533400" y="228600"/>
+            <a:ext cx="8229600" cy="1143000"/>
+          </a:xfrm>
+        </p:spPr>
+        <p:txBody>
+          <a:bodyPr/>
+          <a:lstStyle/>
+          <a:p>
+            <a:r>
+              <a:rPr lang="en-US" dirty="0" smtClean="0"/>
+              <a:t>Query Class</a:t>
+            </a:r>
+            <a:endParaRPr lang="en-US" dirty="0"/>
+          </a:p>
+        </p:txBody>
+      </p:sp>
+      <p:pic>
+        <p:nvPicPr>
+          <p:cNvPr id="1026" name="Picture 2"/>
+          <p:cNvPicPr>
+            <a:picLocks noGrp="1" noChangeAspect="1" noChangeArrowheads="1"/>
+          </p:cNvPicPr>
+          <p:nvPr>
+            <p:ph idx="1"/>
+          </p:nvPr>
+        </p:nvPicPr>
+        <p:blipFill>
+          <a:blip r:embed="rId2">
+            <a:extLst>
+              <a:ext uri="{28A0092B-C50C-407E-A947-70E740481C1C}">
+                <a14:useLocalDpi xmlns:a14="http://schemas.microsoft.com/office/drawing/2010/main" val="0"/>
+              </a:ext>
+            </a:extLst>
+          </a:blip>
+          <a:stretch>
+            <a:fillRect/>
+          </a:stretch>
+        </p:blipFill>
+        <p:spPr bwMode="auto">
+          <a:xfrm>
+            <a:off x="890588" y="1676400"/>
+            <a:ext cx="7362825" cy="3019425"/>
+          </a:xfrm>
+          <a:prstGeom prst="rect">
+            <a:avLst/>
+          </a:prstGeom>
+          <a:noFill/>
+          <a:ln>
+            <a:noFill/>
+          </a:ln>
+          <a:extLst>
+            <a:ext uri="{909E8E84-426E-40DD-AFC4-6F175D3DCCD1}">
+              <a14:hiddenFill xmlns:a14="http://schemas.microsoft.com/office/drawing/2010/main">
+                <a:solidFill>
+                  <a:schemeClr val="accent1"/>
+                </a:solidFill>
+              </a14:hiddenFill>
+            </a:ext>
+            <a:ext uri="{91240B29-F687-4F45-9708-019B960494DF}">
+              <a14:hiddenLine xmlns:a14="http://schemas.microsoft.com/office/drawing/2010/main" w="9525">
+                <a:solidFill>
+                  <a:schemeClr val="tx1"/>
+                </a:solidFill>
+                <a:miter lim="800000"/>
+                <a:headEnd/>
+                <a:tailEnd/>
+              </a14:hiddenLine>
+            </a:ext>
+          </a:extLst>
+        </p:spPr>
+      </p:pic>
+    </p:spTree>
+    <p:extLst>
+      <p:ext uri="{BB962C8B-B14F-4D97-AF65-F5344CB8AC3E}">
+        <p14:creationId xmlns:p14="http://schemas.microsoft.com/office/powerpoint/2010/main" val="1630515808"/>
+      </p:ext>
+    </p:extLst>
+  </p:cSld>
+  <p:clrMapOvr>
+    <a:masterClrMapping/>
+  </p:clrMapOvr>
+  <p:timing>
+    <p:tnLst>
+      <p:par>
+        <p:cTn id="1" dur="indefinite" restart="never" nodeType="tmRoot"/>
+      </p:par>
+    </p:tnLst>
+  </p:timing>
+</p:sld>
+</file>
+
+<file path=ppt/slides/slide14.xml><?xml version="1.0" encoding="utf-8"?>
+<p:sld xmlns:a="http://schemas.openxmlformats.org/drawingml/2006/main" xmlns:r="http://schemas.openxmlformats.org/officeDocument/2006/relationships" xmlns:p="http://schemas.openxmlformats.org/presentationml/2006/main">
+  <p:cSld>
+    <p:spTree>
+      <p:nvGrpSpPr>
+        <p:cNvPr id="1" name=""/>
+        <p:cNvGrpSpPr/>
+        <p:nvPr/>
+      </p:nvGrpSpPr>
+      <p:grpSpPr>
+        <a:xfrm>
+          <a:off x="0" y="0"/>
+          <a:ext cx="0" cy="0"/>
+          <a:chOff x="0" y="0"/>
+          <a:chExt cx="0" cy="0"/>
+        </a:xfrm>
+      </p:grpSpPr>
+      <p:sp>
+        <p:nvSpPr>
+          <p:cNvPr id="5" name="Title 1"/>
+          <p:cNvSpPr>
+            <a:spLocks noGrp="1"/>
+          </p:cNvSpPr>
+          <p:nvPr>
+            <p:ph type="title"/>
+          </p:nvPr>
+        </p:nvSpPr>
+        <p:spPr>
+          <a:xfrm>
+            <a:off x="457200" y="228600"/>
+            <a:ext cx="8229600" cy="609600"/>
+          </a:xfrm>
+        </p:spPr>
+        <p:txBody>
+          <a:bodyPr>
+            <a:normAutofit fontScale="90000"/>
+          </a:bodyPr>
+          <a:lstStyle/>
+          <a:p>
+            <a:r>
+              <a:rPr lang="en-US" dirty="0" smtClean="0"/>
+              <a:t>Search Logic</a:t>
+            </a:r>
+            <a:endParaRPr lang="en-US" dirty="0"/>
+          </a:p>
+        </p:txBody>
+      </p:sp>
+      <p:pic>
+        <p:nvPicPr>
+          <p:cNvPr id="2050" name="Picture 2"/>
+          <p:cNvPicPr>
+            <a:picLocks noGrp="1" noChangeAspect="1" noChangeArrowheads="1"/>
+          </p:cNvPicPr>
+          <p:nvPr>
+            <p:ph idx="1"/>
+          </p:nvPr>
+        </p:nvPicPr>
+        <p:blipFill>
+          <a:blip r:embed="rId2">
+            <a:extLst>
+              <a:ext uri="{28A0092B-C50C-407E-A947-70E740481C1C}">
+                <a14:useLocalDpi xmlns:a14="http://schemas.microsoft.com/office/drawing/2010/main" val="0"/>
+              </a:ext>
+            </a:extLst>
+          </a:blip>
+          <a:srcRect/>
+          <a:stretch>
+            <a:fillRect/>
+          </a:stretch>
+        </p:blipFill>
+        <p:spPr bwMode="auto">
+          <a:xfrm>
+            <a:off x="922273" y="838200"/>
+            <a:ext cx="7299455" cy="5791200"/>
+          </a:xfrm>
+          <a:prstGeom prst="rect">
+            <a:avLst/>
+          </a:prstGeom>
+          <a:noFill/>
+          <a:ln>
+            <a:noFill/>
+          </a:ln>
+          <a:extLst>
+            <a:ext uri="{909E8E84-426E-40DD-AFC4-6F175D3DCCD1}">
+              <a14:hiddenFill xmlns:a14="http://schemas.microsoft.com/office/drawing/2010/main">
+                <a:solidFill>
+                  <a:schemeClr val="accent1"/>
+                </a:solidFill>
+              </a14:hiddenFill>
+            </a:ext>
+            <a:ext uri="{91240B29-F687-4F45-9708-019B960494DF}">
+              <a14:hiddenLine xmlns:a14="http://schemas.microsoft.com/office/drawing/2010/main" w="9525">
+                <a:solidFill>
+                  <a:schemeClr val="tx1"/>
+                </a:solidFill>
+                <a:miter lim="800000"/>
+                <a:headEnd/>
+                <a:tailEnd/>
+              </a14:hiddenLine>
+            </a:ext>
+          </a:extLst>
+        </p:spPr>
+      </p:pic>
+    </p:spTree>
+    <p:extLst>
+      <p:ext uri="{BB962C8B-B14F-4D97-AF65-F5344CB8AC3E}">
+        <p14:creationId xmlns:p14="http://schemas.microsoft.com/office/powerpoint/2010/main" val="2620260008"/>
+      </p:ext>
+    </p:extLst>
+  </p:cSld>
+  <p:clrMapOvr>
+    <a:masterClrMapping/>
+  </p:clrMapOvr>
+  <p:timing>
+    <p:tnLst>
+      <p:par>
+        <p:cTn id="1" dur="indefinite" restart="never" nodeType="tmRoot"/>
+      </p:par>
+    </p:tnLst>
+  </p:timing>
+</p:sld>
+</file>
+
+<file path=ppt/slides/slide15.xml><?xml version="1.0" encoding="utf-8"?>
+<p:sld xmlns:a="http://schemas.openxmlformats.org/drawingml/2006/main" xmlns:r="http://schemas.openxmlformats.org/officeDocument/2006/relationships" xmlns:p="http://schemas.openxmlformats.org/presentationml/2006/main">
+  <p:cSld>
+    <p:spTree>
+      <p:nvGrpSpPr>
+        <p:cNvPr id="1" name=""/>
+        <p:cNvGrpSpPr/>
+        <p:nvPr/>
+      </p:nvGrpSpPr>
+      <p:grpSpPr>
+        <a:xfrm>
+          <a:off x="0" y="0"/>
+          <a:ext cx="0" cy="0"/>
+          <a:chOff x="0" y="0"/>
+          <a:chExt cx="0" cy="0"/>
+        </a:xfrm>
+      </p:grpSpPr>
+      <p:sp>
+        <p:nvSpPr>
+          <p:cNvPr id="5" name="Title 1"/>
+          <p:cNvSpPr>
+            <a:spLocks noGrp="1"/>
+          </p:cNvSpPr>
+          <p:nvPr>
+            <p:ph type="title"/>
+          </p:nvPr>
+        </p:nvSpPr>
+        <p:spPr>
+          <a:xfrm>
+            <a:off x="457200" y="228600"/>
+            <a:ext cx="8229600" cy="609600"/>
+          </a:xfrm>
+        </p:spPr>
+        <p:txBody>
+          <a:bodyPr>
+            <a:normAutofit fontScale="90000"/>
+          </a:bodyPr>
+          <a:lstStyle/>
+          <a:p>
+            <a:r>
+              <a:rPr lang="en-US" dirty="0" smtClean="0"/>
+              <a:t>Autocomplete</a:t>
+            </a:r>
+            <a:endParaRPr lang="en-US" dirty="0"/>
+          </a:p>
+        </p:txBody>
+      </p:sp>
+      <p:pic>
+        <p:nvPicPr>
+          <p:cNvPr id="4098" name="Picture 2"/>
+          <p:cNvPicPr>
+            <a:picLocks noChangeAspect="1" noChangeArrowheads="1"/>
+          </p:cNvPicPr>
+          <p:nvPr/>
+        </p:nvPicPr>
+        <p:blipFill>
+          <a:blip r:embed="rId2">
+            <a:extLst>
+              <a:ext uri="{28A0092B-C50C-407E-A947-70E740481C1C}">
+                <a14:useLocalDpi xmlns:a14="http://schemas.microsoft.com/office/drawing/2010/main" val="0"/>
+              </a:ext>
+            </a:extLst>
+          </a:blip>
+          <a:srcRect/>
+          <a:stretch>
+            <a:fillRect/>
+          </a:stretch>
+        </p:blipFill>
+        <p:spPr bwMode="auto">
+          <a:xfrm>
+            <a:off x="685800" y="1219200"/>
+            <a:ext cx="4219575" cy="1257300"/>
+          </a:xfrm>
+          <a:prstGeom prst="rect">
+            <a:avLst/>
+          </a:prstGeom>
+          <a:noFill/>
+          <a:ln>
+            <a:noFill/>
+          </a:ln>
+          <a:extLst>
+            <a:ext uri="{909E8E84-426E-40DD-AFC4-6F175D3DCCD1}">
+              <a14:hiddenFill xmlns:a14="http://schemas.microsoft.com/office/drawing/2010/main">
+                <a:solidFill>
+                  <a:schemeClr val="accent1"/>
+                </a:solidFill>
+              </a14:hiddenFill>
+            </a:ext>
+            <a:ext uri="{91240B29-F687-4F45-9708-019B960494DF}">
+              <a14:hiddenLine xmlns:a14="http://schemas.microsoft.com/office/drawing/2010/main" w="9525">
+                <a:solidFill>
+                  <a:schemeClr val="tx1"/>
+                </a:solidFill>
+                <a:miter lim="800000"/>
+                <a:headEnd/>
+                <a:tailEnd/>
+              </a14:hiddenLine>
+            </a:ext>
+          </a:extLst>
+        </p:spPr>
+      </p:pic>
+      <p:pic>
+        <p:nvPicPr>
+          <p:cNvPr id="4099" name="Picture 3"/>
+          <p:cNvPicPr>
+            <a:picLocks noChangeAspect="1" noChangeArrowheads="1"/>
+          </p:cNvPicPr>
+          <p:nvPr/>
+        </p:nvPicPr>
+        <p:blipFill>
+          <a:blip r:embed="rId3">
+            <a:extLst>
+              <a:ext uri="{28A0092B-C50C-407E-A947-70E740481C1C}">
+                <a14:useLocalDpi xmlns:a14="http://schemas.microsoft.com/office/drawing/2010/main" val="0"/>
+              </a:ext>
+            </a:extLst>
+          </a:blip>
+          <a:srcRect/>
+          <a:stretch>
+            <a:fillRect/>
+          </a:stretch>
+        </p:blipFill>
+        <p:spPr bwMode="auto">
+          <a:xfrm>
+            <a:off x="609600" y="2895600"/>
+            <a:ext cx="5810250" cy="2628900"/>
+          </a:xfrm>
+          <a:prstGeom prst="rect">
+            <a:avLst/>
+          </a:prstGeom>
+          <a:noFill/>
+          <a:ln>
+            <a:noFill/>
+          </a:ln>
+          <a:extLst>
+            <a:ext uri="{909E8E84-426E-40DD-AFC4-6F175D3DCCD1}">
+              <a14:hiddenFill xmlns:a14="http://schemas.microsoft.com/office/drawing/2010/main">
+                <a:solidFill>
+                  <a:schemeClr val="accent1"/>
+                </a:solidFill>
+              </a14:hiddenFill>
+            </a:ext>
+            <a:ext uri="{91240B29-F687-4F45-9708-019B960494DF}">
+              <a14:hiddenLine xmlns:a14="http://schemas.microsoft.com/office/drawing/2010/main" w="9525">
+                <a:solidFill>
+                  <a:schemeClr val="tx1"/>
+                </a:solidFill>
+                <a:miter lim="800000"/>
+                <a:headEnd/>
+                <a:tailEnd/>
+              </a14:hiddenLine>
+            </a:ext>
+          </a:extLst>
+        </p:spPr>
+      </p:pic>
+    </p:spTree>
+    <p:extLst>
+      <p:ext uri="{BB962C8B-B14F-4D97-AF65-F5344CB8AC3E}">
+        <p14:creationId xmlns:p14="http://schemas.microsoft.com/office/powerpoint/2010/main" val="1655712591"/>
+      </p:ext>
+    </p:extLst>
+  </p:cSld>
+  <p:clrMapOvr>
+    <a:masterClrMapping/>
+  </p:clrMapOvr>
+  <p:timing>
+    <p:tnLst>
+      <p:par>
+        <p:cTn id="1" dur="indefinite" restart="never" nodeType="tmRoot"/>
+      </p:par>
+    </p:tnLst>
+  </p:timing>
+</p:sld>
+</file>
+
+<file path=ppt/slides/slide16.xml><?xml version="1.0" encoding="utf-8"?>
+<p:sld xmlns:a="http://schemas.openxmlformats.org/drawingml/2006/main" xmlns:r="http://schemas.openxmlformats.org/officeDocument/2006/relationships" xmlns:p="http://schemas.openxmlformats.org/presentationml/2006/main">
+  <p:cSld>
+    <p:spTree>
+      <p:nvGrpSpPr>
+        <p:cNvPr id="1" name=""/>
+        <p:cNvGrpSpPr/>
+        <p:nvPr/>
+      </p:nvGrpSpPr>
+      <p:grpSpPr>
+        <a:xfrm>
+          <a:off x="0" y="0"/>
+          <a:ext cx="0" cy="0"/>
+          <a:chOff x="0" y="0"/>
+          <a:chExt cx="0" cy="0"/>
+        </a:xfrm>
+      </p:grpSpPr>
+      <p:sp>
+        <p:nvSpPr>
           <p:cNvPr id="4" name="Title 3"/>
           <p:cNvSpPr>
             <a:spLocks noGrp="1"/>
@@ -6711,7 +7394,7 @@
 </p:sld>
 </file>
 
-<file path=ppt/slides/slide11.xml><?xml version="1.0" encoding="utf-8"?>
+<file path=ppt/slides/slide17.xml><?xml version="1.0" encoding="utf-8"?>
 <p:sld xmlns:a="http://schemas.openxmlformats.org/drawingml/2006/main" xmlns:r="http://schemas.openxmlformats.org/officeDocument/2006/relationships" xmlns:p="http://schemas.openxmlformats.org/presentationml/2006/main">
   <p:cSld>
     <p:spTree>
@@ -6832,7 +7515,7 @@
 </p:sld>
 </file>
 
-<file path=ppt/slides/slide12.xml><?xml version="1.0" encoding="utf-8"?>
+<file path=ppt/slides/slide18.xml><?xml version="1.0" encoding="utf-8"?>
 <p:sld xmlns:a="http://schemas.openxmlformats.org/drawingml/2006/main" xmlns:r="http://schemas.openxmlformats.org/officeDocument/2006/relationships" xmlns:p="http://schemas.openxmlformats.org/presentationml/2006/main">
   <p:cSld>
     <p:spTree>
@@ -7007,7 +7690,7 @@
 </p:sld>
 </file>
 
-<file path=ppt/slides/slide13.xml><?xml version="1.0" encoding="utf-8"?>
+<file path=ppt/slides/slide19.xml><?xml version="1.0" encoding="utf-8"?>
 <p:sld xmlns:a="http://schemas.openxmlformats.org/drawingml/2006/main" xmlns:r="http://schemas.openxmlformats.org/officeDocument/2006/relationships" xmlns:p="http://schemas.openxmlformats.org/presentationml/2006/main">
   <p:cSld>
     <p:spTree>
@@ -7112,550 +7795,6 @@
     <p:extLst>
       <p:ext uri="{BB962C8B-B14F-4D97-AF65-F5344CB8AC3E}">
         <p14:creationId xmlns:p14="http://schemas.microsoft.com/office/powerpoint/2010/main" val="4064245660"/>
-      </p:ext>
-    </p:extLst>
-  </p:cSld>
-  <p:clrMapOvr>
-    <a:masterClrMapping/>
-  </p:clrMapOvr>
-  <p:timing>
-    <p:tnLst>
-      <p:par>
-        <p:cTn id="1" dur="indefinite" restart="never" nodeType="tmRoot"/>
-      </p:par>
-    </p:tnLst>
-  </p:timing>
-</p:sld>
-</file>
-
-<file path=ppt/slides/slide14.xml><?xml version="1.0" encoding="utf-8"?>
-<p:sld xmlns:a="http://schemas.openxmlformats.org/drawingml/2006/main" xmlns:r="http://schemas.openxmlformats.org/officeDocument/2006/relationships" xmlns:p="http://schemas.openxmlformats.org/presentationml/2006/main">
-  <p:cSld>
-    <p:spTree>
-      <p:nvGrpSpPr>
-        <p:cNvPr id="1" name=""/>
-        <p:cNvGrpSpPr/>
-        <p:nvPr/>
-      </p:nvGrpSpPr>
-      <p:grpSpPr>
-        <a:xfrm>
-          <a:off x="0" y="0"/>
-          <a:ext cx="0" cy="0"/>
-          <a:chOff x="0" y="0"/>
-          <a:chExt cx="0" cy="0"/>
-        </a:xfrm>
-      </p:grpSpPr>
-      <p:sp>
-        <p:nvSpPr>
-          <p:cNvPr id="2" name="Title 1"/>
-          <p:cNvSpPr>
-            <a:spLocks noGrp="1"/>
-          </p:cNvSpPr>
-          <p:nvPr>
-            <p:ph type="title"/>
-          </p:nvPr>
-        </p:nvSpPr>
-        <p:spPr/>
-        <p:txBody>
-          <a:bodyPr/>
-          <a:lstStyle/>
-          <a:p>
-            <a:r>
-              <a:rPr lang="en-US" dirty="0" smtClean="0"/>
-              <a:t>ORM – </a:t>
-            </a:r>
-            <a:r>
-              <a:rPr lang="en-US" smtClean="0"/>
-              <a:t>Entity Framework</a:t>
-            </a:r>
-            <a:endParaRPr lang="en-US"/>
-          </a:p>
-        </p:txBody>
-      </p:sp>
-      <p:sp>
-        <p:nvSpPr>
-          <p:cNvPr id="3" name="Content Placeholder 2"/>
-          <p:cNvSpPr>
-            <a:spLocks noGrp="1"/>
-          </p:cNvSpPr>
-          <p:nvPr>
-            <p:ph idx="1"/>
-          </p:nvPr>
-        </p:nvSpPr>
-        <p:spPr/>
-        <p:txBody>
-          <a:bodyPr>
-            <a:normAutofit fontScale="92500" lnSpcReduction="10000"/>
-          </a:bodyPr>
-          <a:lstStyle/>
-          <a:p>
-            <a:r>
-              <a:rPr lang="en-US" dirty="0" smtClean="0"/>
-              <a:t>Uses simple common syntax (LINQ) to </a:t>
-            </a:r>
-            <a:r>
-              <a:rPr lang="en-US" dirty="0" smtClean="0"/>
-              <a:t>Add/Read/Delete/Update </a:t>
-            </a:r>
-            <a:r>
-              <a:rPr lang="en-US" dirty="0" smtClean="0"/>
-              <a:t>objects. </a:t>
-            </a:r>
-          </a:p>
-          <a:p>
-            <a:pPr lvl="1"/>
-            <a:r>
-              <a:rPr lang="en-US" dirty="0" smtClean="0"/>
-              <a:t>No need to deal with </a:t>
-            </a:r>
-            <a:r>
-              <a:rPr lang="en-US" smtClean="0"/>
-              <a:t>writing much </a:t>
-            </a:r>
-            <a:r>
-              <a:rPr lang="en-US" dirty="0" smtClean="0"/>
-              <a:t>SQL</a:t>
-            </a:r>
-          </a:p>
-          <a:p>
-            <a:endParaRPr lang="en-US" dirty="0" smtClean="0"/>
-          </a:p>
-          <a:p>
-            <a:r>
-              <a:rPr lang="en-US" dirty="0" smtClean="0"/>
-              <a:t>Handles object-relational </a:t>
-            </a:r>
-            <a:r>
-              <a:rPr lang="en-US" dirty="0"/>
-              <a:t>mapping (ORM) </a:t>
-            </a:r>
-            <a:r>
-              <a:rPr lang="en-US" dirty="0" smtClean="0"/>
-              <a:t>on its own.</a:t>
-            </a:r>
-          </a:p>
-          <a:p>
-            <a:endParaRPr lang="en-US" dirty="0"/>
-          </a:p>
-          <a:p>
-            <a:r>
-              <a:rPr lang="en-US" dirty="0"/>
-              <a:t>Builds </a:t>
-            </a:r>
-            <a:r>
-              <a:rPr lang="en-US" dirty="0" smtClean="0"/>
-              <a:t>scaffolding </a:t>
-            </a:r>
-            <a:r>
-              <a:rPr lang="en-US" dirty="0"/>
-              <a:t>for controllers and </a:t>
-            </a:r>
-            <a:r>
-              <a:rPr lang="en-US" dirty="0" smtClean="0"/>
-              <a:t>views based on models</a:t>
-            </a:r>
-            <a:endParaRPr lang="en-US" dirty="0"/>
-          </a:p>
-        </p:txBody>
-      </p:sp>
-    </p:spTree>
-    <p:extLst>
-      <p:ext uri="{BB962C8B-B14F-4D97-AF65-F5344CB8AC3E}">
-        <p14:creationId xmlns:p14="http://schemas.microsoft.com/office/powerpoint/2010/main" val="3506269559"/>
-      </p:ext>
-    </p:extLst>
-  </p:cSld>
-  <p:clrMapOvr>
-    <a:masterClrMapping/>
-  </p:clrMapOvr>
-</p:sld>
-</file>
-
-<file path=ppt/slides/slide15.xml><?xml version="1.0" encoding="utf-8"?>
-<p:sld xmlns:a="http://schemas.openxmlformats.org/drawingml/2006/main" xmlns:r="http://schemas.openxmlformats.org/officeDocument/2006/relationships" xmlns:p="http://schemas.openxmlformats.org/presentationml/2006/main">
-  <p:cSld>
-    <p:spTree>
-      <p:nvGrpSpPr>
-        <p:cNvPr id="1" name=""/>
-        <p:cNvGrpSpPr/>
-        <p:nvPr/>
-      </p:nvGrpSpPr>
-      <p:grpSpPr>
-        <a:xfrm>
-          <a:off x="0" y="0"/>
-          <a:ext cx="0" cy="0"/>
-          <a:chOff x="0" y="0"/>
-          <a:chExt cx="0" cy="0"/>
-        </a:xfrm>
-      </p:grpSpPr>
-      <p:sp>
-        <p:nvSpPr>
-          <p:cNvPr id="2" name="Title 1"/>
-          <p:cNvSpPr>
-            <a:spLocks noGrp="1"/>
-          </p:cNvSpPr>
-          <p:nvPr>
-            <p:ph type="title"/>
-          </p:nvPr>
-        </p:nvSpPr>
-        <p:spPr/>
-        <p:txBody>
-          <a:bodyPr/>
-          <a:lstStyle/>
-          <a:p>
-            <a:r>
-              <a:rPr lang="en-US" dirty="0" smtClean="0"/>
-              <a:t>Asset Models – CRUD</a:t>
-            </a:r>
-            <a:endParaRPr lang="en-US" dirty="0"/>
-          </a:p>
-        </p:txBody>
-      </p:sp>
-      <p:pic>
-        <p:nvPicPr>
-          <p:cNvPr id="4" name="Picture 3"/>
-          <p:cNvPicPr>
-            <a:picLocks noChangeAspect="1"/>
-          </p:cNvPicPr>
-          <p:nvPr/>
-        </p:nvPicPr>
-        <p:blipFill>
-          <a:blip r:embed="rId2"/>
-          <a:stretch>
-            <a:fillRect/>
-          </a:stretch>
-        </p:blipFill>
-        <p:spPr>
-          <a:xfrm>
-            <a:off x="1104900" y="1219200"/>
-            <a:ext cx="6934200" cy="5470432"/>
-          </a:xfrm>
-          <a:prstGeom prst="rect">
-            <a:avLst/>
-          </a:prstGeom>
-        </p:spPr>
-      </p:pic>
-    </p:spTree>
-    <p:extLst>
-      <p:ext uri="{BB962C8B-B14F-4D97-AF65-F5344CB8AC3E}">
-        <p14:creationId xmlns:p14="http://schemas.microsoft.com/office/powerpoint/2010/main" val="403398819"/>
-      </p:ext>
-    </p:extLst>
-  </p:cSld>
-  <p:clrMapOvr>
-    <a:masterClrMapping/>
-  </p:clrMapOvr>
-</p:sld>
-</file>
-
-<file path=ppt/slides/slide16.xml><?xml version="1.0" encoding="utf-8"?>
-<p:sld xmlns:a="http://schemas.openxmlformats.org/drawingml/2006/main" xmlns:r="http://schemas.openxmlformats.org/officeDocument/2006/relationships" xmlns:p="http://schemas.openxmlformats.org/presentationml/2006/main">
-  <p:cSld>
-    <p:spTree>
-      <p:nvGrpSpPr>
-        <p:cNvPr id="1" name=""/>
-        <p:cNvGrpSpPr/>
-        <p:nvPr/>
-      </p:nvGrpSpPr>
-      <p:grpSpPr>
-        <a:xfrm>
-          <a:off x="0" y="0"/>
-          <a:ext cx="0" cy="0"/>
-          <a:chOff x="0" y="0"/>
-          <a:chExt cx="0" cy="0"/>
-        </a:xfrm>
-      </p:grpSpPr>
-      <p:sp>
-        <p:nvSpPr>
-          <p:cNvPr id="2" name="Title 1"/>
-          <p:cNvSpPr>
-            <a:spLocks noGrp="1"/>
-          </p:cNvSpPr>
-          <p:nvPr>
-            <p:ph type="title"/>
-          </p:nvPr>
-        </p:nvSpPr>
-        <p:spPr/>
-        <p:txBody>
-          <a:bodyPr/>
-          <a:lstStyle/>
-          <a:p>
-            <a:r>
-              <a:rPr lang="en-US" dirty="0" smtClean="0"/>
-              <a:t>Asset Models - CRUD</a:t>
-            </a:r>
-            <a:endParaRPr lang="en-US" dirty="0"/>
-          </a:p>
-        </p:txBody>
-      </p:sp>
-      <p:pic>
-        <p:nvPicPr>
-          <p:cNvPr id="5" name="Picture 4"/>
-          <p:cNvPicPr>
-            <a:picLocks noChangeAspect="1"/>
-          </p:cNvPicPr>
-          <p:nvPr/>
-        </p:nvPicPr>
-        <p:blipFill>
-          <a:blip r:embed="rId2"/>
-          <a:stretch>
-            <a:fillRect/>
-          </a:stretch>
-        </p:blipFill>
-        <p:spPr>
-          <a:xfrm>
-            <a:off x="261424" y="1676400"/>
-            <a:ext cx="8621152" cy="4305300"/>
-          </a:xfrm>
-          <a:prstGeom prst="rect">
-            <a:avLst/>
-          </a:prstGeom>
-        </p:spPr>
-      </p:pic>
-    </p:spTree>
-    <p:extLst>
-      <p:ext uri="{BB962C8B-B14F-4D97-AF65-F5344CB8AC3E}">
-        <p14:creationId xmlns:p14="http://schemas.microsoft.com/office/powerpoint/2010/main" val="2655739801"/>
-      </p:ext>
-    </p:extLst>
-  </p:cSld>
-  <p:clrMapOvr>
-    <a:masterClrMapping/>
-  </p:clrMapOvr>
-</p:sld>
-</file>
-
-<file path=ppt/slides/slide17.xml><?xml version="1.0" encoding="utf-8"?>
-<p:sld xmlns:a="http://schemas.openxmlformats.org/drawingml/2006/main" xmlns:r="http://schemas.openxmlformats.org/officeDocument/2006/relationships" xmlns:p="http://schemas.openxmlformats.org/presentationml/2006/main">
-  <p:cSld>
-    <p:spTree>
-      <p:nvGrpSpPr>
-        <p:cNvPr id="1" name=""/>
-        <p:cNvGrpSpPr/>
-        <p:nvPr/>
-      </p:nvGrpSpPr>
-      <p:grpSpPr>
-        <a:xfrm>
-          <a:off x="0" y="0"/>
-          <a:ext cx="0" cy="0"/>
-          <a:chOff x="0" y="0"/>
-          <a:chExt cx="0" cy="0"/>
-        </a:xfrm>
-      </p:grpSpPr>
-      <p:sp>
-        <p:nvSpPr>
-          <p:cNvPr id="2" name="Title 1"/>
-          <p:cNvSpPr>
-            <a:spLocks noGrp="1"/>
-          </p:cNvSpPr>
-          <p:nvPr>
-            <p:ph type="title"/>
-          </p:nvPr>
-        </p:nvSpPr>
-        <p:spPr/>
-        <p:txBody>
-          <a:bodyPr/>
-          <a:lstStyle/>
-          <a:p>
-            <a:r>
-              <a:rPr lang="en-US" dirty="0" smtClean="0"/>
-              <a:t>Asset Models - CRUD</a:t>
-            </a:r>
-            <a:endParaRPr lang="en-US" dirty="0"/>
-          </a:p>
-        </p:txBody>
-      </p:sp>
-      <p:pic>
-        <p:nvPicPr>
-          <p:cNvPr id="4" name="Picture 3"/>
-          <p:cNvPicPr>
-            <a:picLocks noChangeAspect="1"/>
-          </p:cNvPicPr>
-          <p:nvPr/>
-        </p:nvPicPr>
-        <p:blipFill>
-          <a:blip r:embed="rId2"/>
-          <a:stretch>
-            <a:fillRect/>
-          </a:stretch>
-        </p:blipFill>
-        <p:spPr>
-          <a:xfrm>
-            <a:off x="556266" y="1828800"/>
-            <a:ext cx="8031467" cy="4029075"/>
-          </a:xfrm>
-          <a:prstGeom prst="rect">
-            <a:avLst/>
-          </a:prstGeom>
-        </p:spPr>
-      </p:pic>
-    </p:spTree>
-    <p:extLst>
-      <p:ext uri="{BB962C8B-B14F-4D97-AF65-F5344CB8AC3E}">
-        <p14:creationId xmlns:p14="http://schemas.microsoft.com/office/powerpoint/2010/main" val="4007096409"/>
-      </p:ext>
-    </p:extLst>
-  </p:cSld>
-  <p:clrMapOvr>
-    <a:masterClrMapping/>
-  </p:clrMapOvr>
-</p:sld>
-</file>
-
-<file path=ppt/slides/slide18.xml><?xml version="1.0" encoding="utf-8"?>
-<p:sld xmlns:a="http://schemas.openxmlformats.org/drawingml/2006/main" xmlns:r="http://schemas.openxmlformats.org/officeDocument/2006/relationships" xmlns:p="http://schemas.openxmlformats.org/presentationml/2006/main">
-  <p:cSld>
-    <p:spTree>
-      <p:nvGrpSpPr>
-        <p:cNvPr id="1" name=""/>
-        <p:cNvGrpSpPr/>
-        <p:nvPr/>
-      </p:nvGrpSpPr>
-      <p:grpSpPr>
-        <a:xfrm>
-          <a:off x="0" y="0"/>
-          <a:ext cx="0" cy="0"/>
-          <a:chOff x="0" y="0"/>
-          <a:chExt cx="0" cy="0"/>
-        </a:xfrm>
-      </p:grpSpPr>
-      <p:sp>
-        <p:nvSpPr>
-          <p:cNvPr id="2" name="Title 1"/>
-          <p:cNvSpPr>
-            <a:spLocks noGrp="1"/>
-          </p:cNvSpPr>
-          <p:nvPr>
-            <p:ph type="title"/>
-          </p:nvPr>
-        </p:nvSpPr>
-        <p:spPr/>
-        <p:txBody>
-          <a:bodyPr/>
-          <a:lstStyle/>
-          <a:p>
-            <a:r>
-              <a:rPr lang="en-US" dirty="0" smtClean="0"/>
-              <a:t>Asset Models – Edit View</a:t>
-            </a:r>
-            <a:endParaRPr lang="en-US" dirty="0"/>
-          </a:p>
-        </p:txBody>
-      </p:sp>
-      <p:pic>
-        <p:nvPicPr>
-          <p:cNvPr id="4" name="Picture 3"/>
-          <p:cNvPicPr>
-            <a:picLocks noChangeAspect="1"/>
-          </p:cNvPicPr>
-          <p:nvPr/>
-        </p:nvPicPr>
-        <p:blipFill>
-          <a:blip r:embed="rId2"/>
-          <a:stretch>
-            <a:fillRect/>
-          </a:stretch>
-        </p:blipFill>
-        <p:spPr>
-          <a:xfrm>
-            <a:off x="495300" y="1295400"/>
-            <a:ext cx="8475330" cy="5181600"/>
-          </a:xfrm>
-          <a:prstGeom prst="rect">
-            <a:avLst/>
-          </a:prstGeom>
-        </p:spPr>
-      </p:pic>
-    </p:spTree>
-    <p:extLst>
-      <p:ext uri="{BB962C8B-B14F-4D97-AF65-F5344CB8AC3E}">
-        <p14:creationId xmlns:p14="http://schemas.microsoft.com/office/powerpoint/2010/main" val="3696965305"/>
-      </p:ext>
-    </p:extLst>
-  </p:cSld>
-  <p:clrMapOvr>
-    <a:masterClrMapping/>
-  </p:clrMapOvr>
-  <p:timing>
-    <p:tnLst>
-      <p:par>
-        <p:cTn id="1" dur="indefinite" restart="never" nodeType="tmRoot"/>
-      </p:par>
-    </p:tnLst>
-  </p:timing>
-</p:sld>
-</file>
-
-<file path=ppt/slides/slide19.xml><?xml version="1.0" encoding="utf-8"?>
-<p:sld xmlns:a="http://schemas.openxmlformats.org/drawingml/2006/main" xmlns:r="http://schemas.openxmlformats.org/officeDocument/2006/relationships" xmlns:p="http://schemas.openxmlformats.org/presentationml/2006/main">
-  <p:cSld>
-    <p:spTree>
-      <p:nvGrpSpPr>
-        <p:cNvPr id="1" name=""/>
-        <p:cNvGrpSpPr/>
-        <p:nvPr/>
-      </p:nvGrpSpPr>
-      <p:grpSpPr>
-        <a:xfrm>
-          <a:off x="0" y="0"/>
-          <a:ext cx="0" cy="0"/>
-          <a:chOff x="0" y="0"/>
-          <a:chExt cx="0" cy="0"/>
-        </a:xfrm>
-      </p:grpSpPr>
-      <p:sp>
-        <p:nvSpPr>
-          <p:cNvPr id="2" name="Title 1"/>
-          <p:cNvSpPr>
-            <a:spLocks noGrp="1"/>
-          </p:cNvSpPr>
-          <p:nvPr>
-            <p:ph type="title"/>
-          </p:nvPr>
-        </p:nvSpPr>
-        <p:spPr/>
-        <p:txBody>
-          <a:bodyPr>
-            <a:normAutofit/>
-          </a:bodyPr>
-          <a:lstStyle/>
-          <a:p>
-            <a:r>
-              <a:rPr lang="en-US" dirty="0" smtClean="0"/>
-              <a:t>Asset Models – Edit View</a:t>
-            </a:r>
-            <a:endParaRPr lang="en-US" dirty="0"/>
-          </a:p>
-        </p:txBody>
-      </p:sp>
-      <p:pic>
-        <p:nvPicPr>
-          <p:cNvPr id="4" name="Picture 3"/>
-          <p:cNvPicPr>
-            <a:picLocks noChangeAspect="1"/>
-          </p:cNvPicPr>
-          <p:nvPr/>
-        </p:nvPicPr>
-        <p:blipFill>
-          <a:blip r:embed="rId2"/>
-          <a:stretch>
-            <a:fillRect/>
-          </a:stretch>
-        </p:blipFill>
-        <p:spPr>
-          <a:xfrm>
-            <a:off x="152400" y="1828800"/>
-            <a:ext cx="9601200" cy="3581400"/>
-          </a:xfrm>
-          <a:prstGeom prst="rect">
-            <a:avLst/>
-          </a:prstGeom>
-        </p:spPr>
-      </p:pic>
-    </p:spTree>
-    <p:extLst>
-      <p:ext uri="{BB962C8B-B14F-4D97-AF65-F5344CB8AC3E}">
-        <p14:creationId xmlns:p14="http://schemas.microsoft.com/office/powerpoint/2010/main" val="1633388588"/>
       </p:ext>
     </p:extLst>
   </p:cSld>
@@ -8178,7 +8317,7 @@
             <a:spLocks noGrp="1"/>
           </p:cNvSpPr>
           <p:nvPr>
-            <p:ph type="ctrTitle"/>
+            <p:ph type="title"/>
           </p:nvPr>
         </p:nvSpPr>
         <p:spPr/>
@@ -8188,7 +8327,89 @@
           <a:p>
             <a:r>
               <a:rPr lang="en-US" dirty="0" smtClean="0"/>
-              <a:t>Asset Search</a:t>
+              <a:t>ORM – </a:t>
+            </a:r>
+            <a:r>
+              <a:rPr lang="en-US" smtClean="0"/>
+              <a:t>Entity Framework</a:t>
+            </a:r>
+            <a:endParaRPr lang="en-US"/>
+          </a:p>
+        </p:txBody>
+      </p:sp>
+      <p:sp>
+        <p:nvSpPr>
+          <p:cNvPr id="3" name="Content Placeholder 2"/>
+          <p:cNvSpPr>
+            <a:spLocks noGrp="1"/>
+          </p:cNvSpPr>
+          <p:nvPr>
+            <p:ph idx="1"/>
+          </p:nvPr>
+        </p:nvSpPr>
+        <p:spPr/>
+        <p:txBody>
+          <a:bodyPr>
+            <a:normAutofit fontScale="92500" lnSpcReduction="10000"/>
+          </a:bodyPr>
+          <a:lstStyle/>
+          <a:p>
+            <a:r>
+              <a:rPr lang="en-US" dirty="0" smtClean="0"/>
+              <a:t>Uses simple common syntax (LINQ) to Add/Read/Delete/Update objects. </a:t>
+            </a:r>
+          </a:p>
+          <a:p>
+            <a:pPr lvl="1"/>
+            <a:r>
+              <a:rPr lang="en-US" dirty="0" smtClean="0"/>
+              <a:t>No need to deal with </a:t>
+            </a:r>
+            <a:r>
+              <a:rPr lang="en-US" smtClean="0"/>
+              <a:t>writing much </a:t>
+            </a:r>
+            <a:r>
+              <a:rPr lang="en-US" dirty="0" smtClean="0"/>
+              <a:t>SQL</a:t>
+            </a:r>
+          </a:p>
+          <a:p>
+            <a:endParaRPr lang="en-US" dirty="0" smtClean="0"/>
+          </a:p>
+          <a:p>
+            <a:r>
+              <a:rPr lang="en-US" dirty="0" smtClean="0"/>
+              <a:t>Handles object-relational </a:t>
+            </a:r>
+            <a:r>
+              <a:rPr lang="en-US" dirty="0"/>
+              <a:t>mapping (ORM) </a:t>
+            </a:r>
+            <a:r>
+              <a:rPr lang="en-US" dirty="0" smtClean="0"/>
+              <a:t>on its own.</a:t>
+            </a:r>
+          </a:p>
+          <a:p>
+            <a:endParaRPr lang="en-US" dirty="0"/>
+          </a:p>
+          <a:p>
+            <a:r>
+              <a:rPr lang="en-US" dirty="0"/>
+              <a:t>Builds </a:t>
+            </a:r>
+            <a:r>
+              <a:rPr lang="en-US" dirty="0" smtClean="0"/>
+              <a:t>scaffolding </a:t>
+            </a:r>
+            <a:r>
+              <a:rPr lang="en-US" dirty="0"/>
+              <a:t>for controllers and </a:t>
+            </a:r>
+            <a:r>
+              <a:rPr lang="en-US" dirty="0" smtClean="0"/>
+              <a:t>views based on models</a:t>
             </a:r>
             <a:endParaRPr lang="en-US" dirty="0"/>
           </a:p>
@@ -8197,20 +8418,13 @@
     </p:spTree>
     <p:extLst>
       <p:ext uri="{BB962C8B-B14F-4D97-AF65-F5344CB8AC3E}">
-        <p14:creationId xmlns:p14="http://schemas.microsoft.com/office/powerpoint/2010/main" val="4280261589"/>
+        <p14:creationId xmlns:p14="http://schemas.microsoft.com/office/powerpoint/2010/main" val="3973532458"/>
       </p:ext>
     </p:extLst>
   </p:cSld>
   <p:clrMapOvr>
     <a:masterClrMapping/>
   </p:clrMapOvr>
-  <p:timing>
-    <p:tnLst>
-      <p:par>
-        <p:cTn id="1" dur="indefinite" restart="never" nodeType="tmRoot"/>
-      </p:par>
-    </p:tnLst>
-  </p:timing>
 </p:sld>
 </file>
 
@@ -8233,7 +8447,7 @@
       </p:grpSpPr>
       <p:sp>
         <p:nvSpPr>
-          <p:cNvPr id="5" name="Title 1"/>
+          <p:cNvPr id="2" name="Title 1"/>
           <p:cNvSpPr>
             <a:spLocks noGrp="1"/>
           </p:cNvSpPr>
@@ -8241,19 +8455,14 @@
             <p:ph type="title"/>
           </p:nvPr>
         </p:nvSpPr>
-        <p:spPr>
-          <a:xfrm>
-            <a:off x="533400" y="228600"/>
-            <a:ext cx="8229600" cy="1143000"/>
-          </a:xfrm>
-        </p:spPr>
+        <p:spPr/>
         <p:txBody>
           <a:bodyPr/>
           <a:lstStyle/>
           <a:p>
             <a:r>
               <a:rPr lang="en-US" dirty="0" smtClean="0"/>
-              <a:t>Controller</a:t>
+              <a:t>Asset Models – CRUD</a:t>
             </a:r>
             <a:endParaRPr lang="en-US" dirty="0"/>
           </a:p>
@@ -8261,75 +8470,38 @@
       </p:sp>
       <p:pic>
         <p:nvPicPr>
-          <p:cNvPr id="1027" name="Picture 3"/>
+          <p:cNvPr id="4" name="Picture 3"/>
           <p:cNvPicPr>
-            <a:picLocks noChangeAspect="1" noChangeArrowheads="1"/>
+            <a:picLocks noChangeAspect="1"/>
           </p:cNvPicPr>
           <p:nvPr/>
         </p:nvPicPr>
         <p:blipFill>
-          <a:blip r:embed="rId2">
-            <a:extLst>
-              <a:ext uri="{28A0092B-C50C-407E-A947-70E740481C1C}">
-                <a14:useLocalDpi xmlns:a14="http://schemas.microsoft.com/office/drawing/2010/main" val="0"/>
-              </a:ext>
-            </a:extLst>
-          </a:blip>
-          <a:srcRect/>
+          <a:blip r:embed="rId2"/>
           <a:stretch>
             <a:fillRect/>
           </a:stretch>
         </p:blipFill>
-        <p:spPr bwMode="auto">
+        <p:spPr>
           <a:xfrm>
-            <a:off x="166688" y="1585913"/>
-            <a:ext cx="8810625" cy="3686175"/>
+            <a:off x="1104900" y="1219200"/>
+            <a:ext cx="6934200" cy="5470432"/>
           </a:xfrm>
           <a:prstGeom prst="rect">
             <a:avLst/>
           </a:prstGeom>
-          <a:noFill/>
-          <a:ln>
-            <a:noFill/>
-          </a:ln>
-          <a:extLst>
-            <a:ext uri="{909E8E84-426E-40DD-AFC4-6F175D3DCCD1}">
-              <a14:hiddenFill xmlns:a14="http://schemas.microsoft.com/office/drawing/2010/main">
-                <a:solidFill>
-                  <a:schemeClr val="accent1"/>
-                </a:solidFill>
-              </a14:hiddenFill>
-            </a:ext>
-            <a:ext uri="{91240B29-F687-4F45-9708-019B960494DF}">
-              <a14:hiddenLine xmlns:a14="http://schemas.microsoft.com/office/drawing/2010/main" w="9525">
-                <a:solidFill>
-                  <a:schemeClr val="tx1"/>
-                </a:solidFill>
-                <a:miter lim="800000"/>
-                <a:headEnd/>
-                <a:tailEnd/>
-              </a14:hiddenLine>
-            </a:ext>
-          </a:extLst>
         </p:spPr>
       </p:pic>
     </p:spTree>
     <p:extLst>
       <p:ext uri="{BB962C8B-B14F-4D97-AF65-F5344CB8AC3E}">
-        <p14:creationId xmlns:p14="http://schemas.microsoft.com/office/powerpoint/2010/main" val="2020609014"/>
+        <p14:creationId xmlns:p14="http://schemas.microsoft.com/office/powerpoint/2010/main" val="829437349"/>
       </p:ext>
     </p:extLst>
   </p:cSld>
   <p:clrMapOvr>
     <a:masterClrMapping/>
   </p:clrMapOvr>
-  <p:timing>
-    <p:tnLst>
-      <p:par>
-        <p:cTn id="1" dur="indefinite" restart="never" nodeType="tmRoot"/>
-      </p:par>
-    </p:tnLst>
-  </p:timing>
 </p:sld>
 </file>
 
@@ -8360,19 +8532,14 @@
             <p:ph type="title"/>
           </p:nvPr>
         </p:nvSpPr>
-        <p:spPr>
-          <a:xfrm>
-            <a:off x="533400" y="228600"/>
-            <a:ext cx="8229600" cy="1143000"/>
-          </a:xfrm>
-        </p:spPr>
+        <p:spPr/>
         <p:txBody>
           <a:bodyPr/>
           <a:lstStyle/>
           <a:p>
             <a:r>
               <a:rPr lang="en-US" dirty="0" smtClean="0"/>
-              <a:t>Query Class</a:t>
+              <a:t>Asset Models - CRUD</a:t>
             </a:r>
             <a:endParaRPr lang="en-US" dirty="0"/>
           </a:p>
@@ -8380,76 +8547,38 @@
       </p:sp>
       <p:pic>
         <p:nvPicPr>
-          <p:cNvPr id="1026" name="Picture 2"/>
+          <p:cNvPr id="5" name="Picture 4"/>
           <p:cNvPicPr>
-            <a:picLocks noGrp="1" noChangeAspect="1" noChangeArrowheads="1"/>
+            <a:picLocks noChangeAspect="1"/>
           </p:cNvPicPr>
-          <p:nvPr>
-            <p:ph idx="1"/>
-          </p:nvPr>
+          <p:nvPr/>
         </p:nvPicPr>
         <p:blipFill>
-          <a:blip r:embed="rId2">
-            <a:extLst>
-              <a:ext uri="{28A0092B-C50C-407E-A947-70E740481C1C}">
-                <a14:useLocalDpi xmlns:a14="http://schemas.microsoft.com/office/drawing/2010/main" val="0"/>
-              </a:ext>
-            </a:extLst>
-          </a:blip>
+          <a:blip r:embed="rId2"/>
           <a:stretch>
             <a:fillRect/>
           </a:stretch>
         </p:blipFill>
-        <p:spPr bwMode="auto">
+        <p:spPr>
           <a:xfrm>
-            <a:off x="890588" y="1676400"/>
-            <a:ext cx="7362825" cy="3019425"/>
+            <a:off x="261424" y="1676400"/>
+            <a:ext cx="8621152" cy="4305300"/>
           </a:xfrm>
           <a:prstGeom prst="rect">
             <a:avLst/>
           </a:prstGeom>
-          <a:noFill/>
-          <a:ln>
-            <a:noFill/>
-          </a:ln>
-          <a:extLst>
-            <a:ext uri="{909E8E84-426E-40DD-AFC4-6F175D3DCCD1}">
-              <a14:hiddenFill xmlns:a14="http://schemas.microsoft.com/office/drawing/2010/main">
-                <a:solidFill>
-                  <a:schemeClr val="accent1"/>
-                </a:solidFill>
-              </a14:hiddenFill>
-            </a:ext>
-            <a:ext uri="{91240B29-F687-4F45-9708-019B960494DF}">
-              <a14:hiddenLine xmlns:a14="http://schemas.microsoft.com/office/drawing/2010/main" w="9525">
-                <a:solidFill>
-                  <a:schemeClr val="tx1"/>
-                </a:solidFill>
-                <a:miter lim="800000"/>
-                <a:headEnd/>
-                <a:tailEnd/>
-              </a14:hiddenLine>
-            </a:ext>
-          </a:extLst>
         </p:spPr>
       </p:pic>
     </p:spTree>
     <p:extLst>
       <p:ext uri="{BB962C8B-B14F-4D97-AF65-F5344CB8AC3E}">
-        <p14:creationId xmlns:p14="http://schemas.microsoft.com/office/powerpoint/2010/main" val="1630515808"/>
+        <p14:creationId xmlns:p14="http://schemas.microsoft.com/office/powerpoint/2010/main" val="1965661205"/>
       </p:ext>
     </p:extLst>
   </p:cSld>
   <p:clrMapOvr>
     <a:masterClrMapping/>
   </p:clrMapOvr>
-  <p:timing>
-    <p:tnLst>
-      <p:par>
-        <p:cTn id="1" dur="indefinite" restart="never" nodeType="tmRoot"/>
-      </p:par>
-    </p:tnLst>
-  </p:timing>
 </p:sld>
 </file>
 
@@ -8472,7 +8601,7 @@
       </p:grpSpPr>
       <p:sp>
         <p:nvSpPr>
-          <p:cNvPr id="5" name="Title 1"/>
+          <p:cNvPr id="2" name="Title 1"/>
           <p:cNvSpPr>
             <a:spLocks noGrp="1"/>
           </p:cNvSpPr>
@@ -8480,21 +8609,14 @@
             <p:ph type="title"/>
           </p:nvPr>
         </p:nvSpPr>
-        <p:spPr>
-          <a:xfrm>
-            <a:off x="457200" y="228600"/>
-            <a:ext cx="8229600" cy="609600"/>
-          </a:xfrm>
-        </p:spPr>
-        <p:txBody>
-          <a:bodyPr>
-            <a:normAutofit fontScale="90000"/>
-          </a:bodyPr>
+        <p:spPr/>
+        <p:txBody>
+          <a:bodyPr/>
           <a:lstStyle/>
           <a:p>
             <a:r>
               <a:rPr lang="en-US" dirty="0" smtClean="0"/>
-              <a:t>Search Logic</a:t>
+              <a:t>Asset Models - CRUD</a:t>
             </a:r>
             <a:endParaRPr lang="en-US" dirty="0"/>
           </a:p>
@@ -8502,77 +8624,38 @@
       </p:sp>
       <p:pic>
         <p:nvPicPr>
-          <p:cNvPr id="2050" name="Picture 2"/>
+          <p:cNvPr id="4" name="Picture 3"/>
           <p:cNvPicPr>
-            <a:picLocks noGrp="1" noChangeAspect="1" noChangeArrowheads="1"/>
+            <a:picLocks noChangeAspect="1"/>
           </p:cNvPicPr>
-          <p:nvPr>
-            <p:ph idx="1"/>
-          </p:nvPr>
+          <p:nvPr/>
         </p:nvPicPr>
         <p:blipFill>
-          <a:blip r:embed="rId2">
-            <a:extLst>
-              <a:ext uri="{28A0092B-C50C-407E-A947-70E740481C1C}">
-                <a14:useLocalDpi xmlns:a14="http://schemas.microsoft.com/office/drawing/2010/main" val="0"/>
-              </a:ext>
-            </a:extLst>
-          </a:blip>
-          <a:srcRect/>
+          <a:blip r:embed="rId2"/>
           <a:stretch>
             <a:fillRect/>
           </a:stretch>
         </p:blipFill>
-        <p:spPr bwMode="auto">
+        <p:spPr>
           <a:xfrm>
-            <a:off x="922273" y="838200"/>
-            <a:ext cx="7299455" cy="5791200"/>
+            <a:off x="556266" y="1828800"/>
+            <a:ext cx="8031467" cy="4029075"/>
           </a:xfrm>
           <a:prstGeom prst="rect">
             <a:avLst/>
           </a:prstGeom>
-          <a:noFill/>
-          <a:ln>
-            <a:noFill/>
-          </a:ln>
-          <a:extLst>
-            <a:ext uri="{909E8E84-426E-40DD-AFC4-6F175D3DCCD1}">
-              <a14:hiddenFill xmlns:a14="http://schemas.microsoft.com/office/drawing/2010/main">
-                <a:solidFill>
-                  <a:schemeClr val="accent1"/>
-                </a:solidFill>
-              </a14:hiddenFill>
-            </a:ext>
-            <a:ext uri="{91240B29-F687-4F45-9708-019B960494DF}">
-              <a14:hiddenLine xmlns:a14="http://schemas.microsoft.com/office/drawing/2010/main" w="9525">
-                <a:solidFill>
-                  <a:schemeClr val="tx1"/>
-                </a:solidFill>
-                <a:miter lim="800000"/>
-                <a:headEnd/>
-                <a:tailEnd/>
-              </a14:hiddenLine>
-            </a:ext>
-          </a:extLst>
         </p:spPr>
       </p:pic>
     </p:spTree>
     <p:extLst>
       <p:ext uri="{BB962C8B-B14F-4D97-AF65-F5344CB8AC3E}">
-        <p14:creationId xmlns:p14="http://schemas.microsoft.com/office/powerpoint/2010/main" val="2620260008"/>
+        <p14:creationId xmlns:p14="http://schemas.microsoft.com/office/powerpoint/2010/main" val="859388310"/>
       </p:ext>
     </p:extLst>
   </p:cSld>
   <p:clrMapOvr>
     <a:masterClrMapping/>
   </p:clrMapOvr>
-  <p:timing>
-    <p:tnLst>
-      <p:par>
-        <p:cTn id="1" dur="indefinite" restart="never" nodeType="tmRoot"/>
-      </p:par>
-    </p:tnLst>
-  </p:timing>
 </p:sld>
 </file>
 
@@ -8595,7 +8678,7 @@
       </p:grpSpPr>
       <p:sp>
         <p:nvSpPr>
-          <p:cNvPr id="5" name="Title 1"/>
+          <p:cNvPr id="2" name="Title 1"/>
           <p:cNvSpPr>
             <a:spLocks noGrp="1"/>
           </p:cNvSpPr>
@@ -8603,21 +8686,14 @@
             <p:ph type="title"/>
           </p:nvPr>
         </p:nvSpPr>
-        <p:spPr>
-          <a:xfrm>
-            <a:off x="457200" y="228600"/>
-            <a:ext cx="8229600" cy="609600"/>
-          </a:xfrm>
-        </p:spPr>
-        <p:txBody>
-          <a:bodyPr>
-            <a:normAutofit fontScale="90000"/>
-          </a:bodyPr>
+        <p:spPr/>
+        <p:txBody>
+          <a:bodyPr/>
           <a:lstStyle/>
           <a:p>
             <a:r>
               <a:rPr lang="en-US" dirty="0" smtClean="0"/>
-              <a:t>Autocomplete</a:t>
+              <a:t>Asset Models – Edit View</a:t>
             </a:r>
             <a:endParaRPr lang="en-US" dirty="0"/>
           </a:p>
@@ -8625,116 +8701,32 @@
       </p:sp>
       <p:pic>
         <p:nvPicPr>
-          <p:cNvPr id="4098" name="Picture 2"/>
+          <p:cNvPr id="4" name="Picture 3"/>
           <p:cNvPicPr>
-            <a:picLocks noChangeAspect="1" noChangeArrowheads="1"/>
+            <a:picLocks noChangeAspect="1"/>
           </p:cNvPicPr>
           <p:nvPr/>
         </p:nvPicPr>
         <p:blipFill>
-          <a:blip r:embed="rId2">
-            <a:extLst>
-              <a:ext uri="{28A0092B-C50C-407E-A947-70E740481C1C}">
-                <a14:useLocalDpi xmlns:a14="http://schemas.microsoft.com/office/drawing/2010/main" val="0"/>
-              </a:ext>
-            </a:extLst>
-          </a:blip>
-          <a:srcRect/>
+          <a:blip r:embed="rId2"/>
           <a:stretch>
             <a:fillRect/>
           </a:stretch>
         </p:blipFill>
-        <p:spPr bwMode="auto">
+        <p:spPr>
           <a:xfrm>
-            <a:off x="685800" y="1219200"/>
-            <a:ext cx="4219575" cy="1257300"/>
+            <a:off x="495300" y="1295400"/>
+            <a:ext cx="8475330" cy="5181600"/>
           </a:xfrm>
           <a:prstGeom prst="rect">
             <a:avLst/>
           </a:prstGeom>
-          <a:noFill/>
-          <a:ln>
-            <a:noFill/>
-          </a:ln>
-          <a:extLst>
-            <a:ext uri="{909E8E84-426E-40DD-AFC4-6F175D3DCCD1}">
-              <a14:hiddenFill xmlns:a14="http://schemas.microsoft.com/office/drawing/2010/main">
-                <a:solidFill>
-                  <a:schemeClr val="accent1"/>
-                </a:solidFill>
-              </a14:hiddenFill>
-            </a:ext>
-            <a:ext uri="{91240B29-F687-4F45-9708-019B960494DF}">
-              <a14:hiddenLine xmlns:a14="http://schemas.microsoft.com/office/drawing/2010/main" w="9525">
-                <a:solidFill>
-                  <a:schemeClr val="tx1"/>
-                </a:solidFill>
-                <a:miter lim="800000"/>
-                <a:headEnd/>
-                <a:tailEnd/>
-              </a14:hiddenLine>
-            </a:ext>
-          </a:extLst>
-        </p:spPr>
-      </p:pic>
-      <p:pic>
-        <p:nvPicPr>
-          <p:cNvPr id="4099" name="Picture 3"/>
-          <p:cNvPicPr>
-            <a:picLocks noChangeAspect="1" noChangeArrowheads="1"/>
-          </p:cNvPicPr>
-          <p:nvPr/>
-        </p:nvPicPr>
-        <p:blipFill>
-          <a:blip r:embed="rId3">
-            <a:extLst>
-              <a:ext uri="{28A0092B-C50C-407E-A947-70E740481C1C}">
-                <a14:useLocalDpi xmlns:a14="http://schemas.microsoft.com/office/drawing/2010/main" val="0"/>
-              </a:ext>
-            </a:extLst>
-          </a:blip>
-          <a:srcRect/>
-          <a:stretch>
-            <a:fillRect/>
-          </a:stretch>
-        </p:blipFill>
-        <p:spPr bwMode="auto">
-          <a:xfrm>
-            <a:off x="609600" y="2895600"/>
-            <a:ext cx="5810250" cy="2628900"/>
-          </a:xfrm>
-          <a:prstGeom prst="rect">
-            <a:avLst/>
-          </a:prstGeom>
-          <a:noFill/>
-          <a:ln>
-            <a:noFill/>
-          </a:ln>
-          <a:extLst>
-            <a:ext uri="{909E8E84-426E-40DD-AFC4-6F175D3DCCD1}">
-              <a14:hiddenFill xmlns:a14="http://schemas.microsoft.com/office/drawing/2010/main">
-                <a:solidFill>
-                  <a:schemeClr val="accent1"/>
-                </a:solidFill>
-              </a14:hiddenFill>
-            </a:ext>
-            <a:ext uri="{91240B29-F687-4F45-9708-019B960494DF}">
-              <a14:hiddenLine xmlns:a14="http://schemas.microsoft.com/office/drawing/2010/main" w="9525">
-                <a:solidFill>
-                  <a:schemeClr val="tx1"/>
-                </a:solidFill>
-                <a:miter lim="800000"/>
-                <a:headEnd/>
-                <a:tailEnd/>
-              </a14:hiddenLine>
-            </a:ext>
-          </a:extLst>
         </p:spPr>
       </p:pic>
     </p:spTree>
     <p:extLst>
       <p:ext uri="{BB962C8B-B14F-4D97-AF65-F5344CB8AC3E}">
-        <p14:creationId xmlns:p14="http://schemas.microsoft.com/office/powerpoint/2010/main" val="1655712591"/>
+        <p14:creationId xmlns:p14="http://schemas.microsoft.com/office/powerpoint/2010/main" val="3853710849"/>
       </p:ext>
     </p:extLst>
   </p:cSld>

</xml_diff>

<commit_message>
Added our names to the PowerPoint
Probably don't want to present with "names of people" on the title slide
XD
</commit_message>
<xml_diff>
--- a/3610 Presentation.pptx
+++ b/3610 Presentation.pptx
@@ -129,7 +129,7 @@
   </p:defaultTextStyle>
   <p:extLst>
     <p:ext uri="{EFAFB233-063F-42B5-8137-9DF3F51BA10A}">
-      <p15:sldGuideLst xmlns:p15="http://schemas.microsoft.com/office/powerpoint/2012/main">
+      <p15:sldGuideLst xmlns:p15="http://schemas.microsoft.com/office/powerpoint/2012/main" xmlns="">
         <p15:guide id="1" orient="horz" pos="2160">
           <p15:clr>
             <a:srgbClr val="A4A3A4"/>
@@ -6621,13 +6621,34 @@
         </p:nvSpPr>
         <p:spPr/>
         <p:txBody>
-          <a:bodyPr/>
-          <a:lstStyle/>
-          <a:p>
-            <a:r>
-              <a:rPr lang="en-US" dirty="0" smtClean="0"/>
-              <a:t>Names of People  </a:t>
-            </a:r>
+          <a:bodyPr>
+            <a:normAutofit fontScale="70000" lnSpcReduction="20000"/>
+          </a:bodyPr>
+          <a:lstStyle/>
+          <a:p>
+            <a:r>
+              <a:rPr lang="en-US" sz="2400" dirty="0"/>
+              <a:t>Mika Griffith </a:t>
+            </a:r>
+          </a:p>
+          <a:p>
+            <a:r>
+              <a:rPr lang="en-US" sz="2400" dirty="0"/>
+              <a:t>Michael Lehman</a:t>
+            </a:r>
+          </a:p>
+          <a:p>
+            <a:r>
+              <a:rPr lang="en-US" sz="2400" dirty="0"/>
+              <a:t>Noah Philips </a:t>
+            </a:r>
+          </a:p>
+          <a:p>
+            <a:r>
+              <a:rPr lang="en-US" sz="2400" dirty="0"/>
+              <a:t>Mark Wells</a:t>
+            </a:r>
+            <a:endParaRPr lang="en-US" sz="2400" dirty="0"/>
           </a:p>
         </p:txBody>
       </p:sp>
@@ -8748,10 +8769,10 @@
   <a:themeElements>
     <a:clrScheme name="Perspective">
       <a:dk1>
-        <a:sysClr val="windowText" lastClr="000000"/>
+        <a:sysClr val="windowText" lastClr="53504C"/>
       </a:dk1>
       <a:lt1>
-        <a:sysClr val="window" lastClr="FFFFFF"/>
+        <a:sysClr val="window" lastClr="F9F8F7"/>
       </a:lt1>
       <a:dk2>
         <a:srgbClr val="283138"/>
@@ -9038,10 +9059,10 @@
   <a:themeElements>
     <a:clrScheme name="Office">
       <a:dk1>
-        <a:sysClr val="windowText" lastClr="000000"/>
+        <a:sysClr val="windowText" lastClr="53504C"/>
       </a:dk1>
       <a:lt1>
-        <a:sysClr val="window" lastClr="FFFFFF"/>
+        <a:sysClr val="window" lastClr="F9F8F7"/>
       </a:lt1>
       <a:dk2>
         <a:srgbClr val="1F497D"/>
@@ -9323,10 +9344,10 @@
   <a:themeElements>
     <a:clrScheme name="Office">
       <a:dk1>
-        <a:sysClr val="windowText" lastClr="000000"/>
+        <a:sysClr val="windowText" lastClr="53504C"/>
       </a:dk1>
       <a:lt1>
-        <a:sysClr val="window" lastClr="FFFFFF"/>
+        <a:sysClr val="window" lastClr="F9F8F7"/>
       </a:lt1>
       <a:dk2>
         <a:srgbClr val="1F497D"/>

</xml_diff>